<commit_message>
Clean-up of ADM tests
</commit_message>
<xml_diff>
--- a/pyntel4004/docs/resources.pptx
+++ b/pyntel4004/docs/resources.pptx
@@ -5,7 +5,7 @@
     <p:sldMasterId id="2147483648" r:id="rId1"/>
   </p:sldMasterIdLst>
   <p:notesMasterIdLst>
-    <p:notesMasterId r:id="rId15"/>
+    <p:notesMasterId r:id="rId16"/>
   </p:notesMasterIdLst>
   <p:sldIdLst>
     <p:sldId id="288" r:id="rId2"/>
@@ -17,10 +17,11 @@
     <p:sldId id="287" r:id="rId8"/>
     <p:sldId id="289" r:id="rId9"/>
     <p:sldId id="290" r:id="rId10"/>
-    <p:sldId id="280" r:id="rId11"/>
-    <p:sldId id="282" r:id="rId12"/>
-    <p:sldId id="284" r:id="rId13"/>
-    <p:sldId id="283" r:id="rId14"/>
+    <p:sldId id="292" r:id="rId11"/>
+    <p:sldId id="280" r:id="rId12"/>
+    <p:sldId id="282" r:id="rId13"/>
+    <p:sldId id="284" r:id="rId14"/>
+    <p:sldId id="283" r:id="rId15"/>
   </p:sldIdLst>
   <p:sldSz cx="12192000" cy="6858000"/>
   <p:notesSz cx="6858000" cy="9144000"/>
@@ -221,7 +222,7 @@
           <a:p>
             <a:fld id="{0E6D88F6-2DDA-CB4F-91F4-9B525386DD76}" type="datetimeFigureOut">
               <a:rPr lang="en-US" smtClean="0"/>
-              <a:t>7/7/21</a:t>
+              <a:t>9/9/21</a:t>
             </a:fld>
             <a:endParaRPr lang="en-US"/>
           </a:p>
@@ -657,7 +658,7 @@
           <a:p>
             <a:fld id="{D651246A-AA0D-1344-AACC-8A747329776B}" type="datetimeFigureOut">
               <a:rPr lang="en-US" smtClean="0"/>
-              <a:t>7/7/21</a:t>
+              <a:t>9/9/21</a:t>
             </a:fld>
             <a:endParaRPr lang="en-US"/>
           </a:p>
@@ -857,7 +858,7 @@
           <a:p>
             <a:fld id="{D651246A-AA0D-1344-AACC-8A747329776B}" type="datetimeFigureOut">
               <a:rPr lang="en-US" smtClean="0"/>
-              <a:t>7/7/21</a:t>
+              <a:t>9/9/21</a:t>
             </a:fld>
             <a:endParaRPr lang="en-US"/>
           </a:p>
@@ -1067,7 +1068,7 @@
           <a:p>
             <a:fld id="{D651246A-AA0D-1344-AACC-8A747329776B}" type="datetimeFigureOut">
               <a:rPr lang="en-US" smtClean="0"/>
-              <a:t>7/7/21</a:t>
+              <a:t>9/9/21</a:t>
             </a:fld>
             <a:endParaRPr lang="en-US"/>
           </a:p>
@@ -1267,7 +1268,7 @@
           <a:p>
             <a:fld id="{D651246A-AA0D-1344-AACC-8A747329776B}" type="datetimeFigureOut">
               <a:rPr lang="en-US" smtClean="0"/>
-              <a:t>7/7/21</a:t>
+              <a:t>9/9/21</a:t>
             </a:fld>
             <a:endParaRPr lang="en-US"/>
           </a:p>
@@ -1543,7 +1544,7 @@
           <a:p>
             <a:fld id="{D651246A-AA0D-1344-AACC-8A747329776B}" type="datetimeFigureOut">
               <a:rPr lang="en-US" smtClean="0"/>
-              <a:t>7/7/21</a:t>
+              <a:t>9/9/21</a:t>
             </a:fld>
             <a:endParaRPr lang="en-US"/>
           </a:p>
@@ -1811,7 +1812,7 @@
           <a:p>
             <a:fld id="{D651246A-AA0D-1344-AACC-8A747329776B}" type="datetimeFigureOut">
               <a:rPr lang="en-US" smtClean="0"/>
-              <a:t>7/7/21</a:t>
+              <a:t>9/9/21</a:t>
             </a:fld>
             <a:endParaRPr lang="en-US"/>
           </a:p>
@@ -2226,7 +2227,7 @@
           <a:p>
             <a:fld id="{D651246A-AA0D-1344-AACC-8A747329776B}" type="datetimeFigureOut">
               <a:rPr lang="en-US" smtClean="0"/>
-              <a:t>7/7/21</a:t>
+              <a:t>9/9/21</a:t>
             </a:fld>
             <a:endParaRPr lang="en-US"/>
           </a:p>
@@ -2368,7 +2369,7 @@
           <a:p>
             <a:fld id="{D651246A-AA0D-1344-AACC-8A747329776B}" type="datetimeFigureOut">
               <a:rPr lang="en-US" smtClean="0"/>
-              <a:t>7/7/21</a:t>
+              <a:t>9/9/21</a:t>
             </a:fld>
             <a:endParaRPr lang="en-US"/>
           </a:p>
@@ -2481,7 +2482,7 @@
           <a:p>
             <a:fld id="{D651246A-AA0D-1344-AACC-8A747329776B}" type="datetimeFigureOut">
               <a:rPr lang="en-US" smtClean="0"/>
-              <a:t>7/7/21</a:t>
+              <a:t>9/9/21</a:t>
             </a:fld>
             <a:endParaRPr lang="en-US"/>
           </a:p>
@@ -2794,7 +2795,7 @@
           <a:p>
             <a:fld id="{D651246A-AA0D-1344-AACC-8A747329776B}" type="datetimeFigureOut">
               <a:rPr lang="en-US" smtClean="0"/>
-              <a:t>7/7/21</a:t>
+              <a:t>9/9/21</a:t>
             </a:fld>
             <a:endParaRPr lang="en-US"/>
           </a:p>
@@ -3083,7 +3084,7 @@
           <a:p>
             <a:fld id="{D651246A-AA0D-1344-AACC-8A747329776B}" type="datetimeFigureOut">
               <a:rPr lang="en-US" smtClean="0"/>
-              <a:t>7/7/21</a:t>
+              <a:t>9/9/21</a:t>
             </a:fld>
             <a:endParaRPr lang="en-US"/>
           </a:p>
@@ -3326,7 +3327,7 @@
           <a:p>
             <a:fld id="{D651246A-AA0D-1344-AACC-8A747329776B}" type="datetimeFigureOut">
               <a:rPr lang="en-US" smtClean="0"/>
-              <a:t>7/7/21</a:t>
+              <a:t>9/9/21</a:t>
             </a:fld>
             <a:endParaRPr lang="en-US"/>
           </a:p>
@@ -3787,6 +3788,2382 @@
 </file>
 
 <file path=ppt/slides/slide10.xml><?xml version="1.0" encoding="utf-8"?>
+<p:sld xmlns:a="http://schemas.openxmlformats.org/drawingml/2006/main" xmlns:r="http://schemas.openxmlformats.org/officeDocument/2006/relationships" xmlns:p="http://schemas.openxmlformats.org/presentationml/2006/main">
+  <p:cSld>
+    <p:spTree>
+      <p:nvGrpSpPr>
+        <p:cNvPr id="1" name=""/>
+        <p:cNvGrpSpPr/>
+        <p:nvPr/>
+      </p:nvGrpSpPr>
+      <p:grpSpPr>
+        <a:xfrm>
+          <a:off x="0" y="0"/>
+          <a:ext cx="0" cy="0"/>
+          <a:chOff x="0" y="0"/>
+          <a:chExt cx="0" cy="0"/>
+        </a:xfrm>
+      </p:grpSpPr>
+      <p:sp>
+        <p:nvSpPr>
+          <p:cNvPr id="4" name="TextBox 3">
+            <a:extLst>
+              <a:ext uri="{FF2B5EF4-FFF2-40B4-BE49-F238E27FC236}">
+                <a16:creationId xmlns:a16="http://schemas.microsoft.com/office/drawing/2014/main" id="{C0976CFA-F460-D04F-AF4D-02350C22FADF}"/>
+              </a:ext>
+            </a:extLst>
+          </p:cNvPr>
+          <p:cNvSpPr txBox="1"/>
+          <p:nvPr/>
+        </p:nvSpPr>
+        <p:spPr>
+          <a:xfrm>
+            <a:off x="10443652" y="6386877"/>
+            <a:ext cx="1576714" cy="369332"/>
+          </a:xfrm>
+          <a:prstGeom prst="rect">
+            <a:avLst/>
+          </a:prstGeom>
+          <a:noFill/>
+          <a:ln w="47625">
+            <a:solidFill>
+              <a:schemeClr val="tx1"/>
+            </a:solidFill>
+          </a:ln>
+        </p:spPr>
+        <p:txBody>
+          <a:bodyPr wrap="square" rtlCol="0">
+            <a:spAutoFit/>
+          </a:bodyPr>
+          <a:lstStyle/>
+          <a:p>
+            <a:r>
+              <a:rPr lang="en-US" dirty="0"/>
+              <a:t>INC</a:t>
+            </a:r>
+          </a:p>
+        </p:txBody>
+      </p:sp>
+      <p:grpSp>
+        <p:nvGrpSpPr>
+          <p:cNvPr id="20" name="Group 19">
+            <a:extLst>
+              <a:ext uri="{FF2B5EF4-FFF2-40B4-BE49-F238E27FC236}">
+                <a16:creationId xmlns:a16="http://schemas.microsoft.com/office/drawing/2014/main" id="{6AF9AC7C-7B56-3D41-ADD2-030694E93EAD}"/>
+              </a:ext>
+            </a:extLst>
+          </p:cNvPr>
+          <p:cNvGrpSpPr/>
+          <p:nvPr/>
+        </p:nvGrpSpPr>
+        <p:grpSpPr>
+          <a:xfrm>
+            <a:off x="7904101" y="-118702"/>
+            <a:ext cx="4116265" cy="6434552"/>
+            <a:chOff x="7904101" y="-118702"/>
+            <a:chExt cx="4116265" cy="6434552"/>
+          </a:xfrm>
+        </p:grpSpPr>
+        <p:sp>
+          <p:nvSpPr>
+            <p:cNvPr id="6" name="Right Arrow 5">
+              <a:extLst>
+                <a:ext uri="{FF2B5EF4-FFF2-40B4-BE49-F238E27FC236}">
+                  <a16:creationId xmlns:a16="http://schemas.microsoft.com/office/drawing/2014/main" id="{1B52BBFC-9CA7-F24F-A635-B80E4B87060D}"/>
+                </a:ext>
+              </a:extLst>
+            </p:cNvPr>
+            <p:cNvSpPr/>
+            <p:nvPr/>
+          </p:nvSpPr>
+          <p:spPr>
+            <a:xfrm rot="16200000">
+              <a:off x="9942545" y="1576559"/>
+              <a:ext cx="306893" cy="129746"/>
+            </a:xfrm>
+            <a:prstGeom prst="rightArrow">
+              <a:avLst/>
+            </a:prstGeom>
+          </p:spPr>
+          <p:style>
+            <a:lnRef idx="0">
+              <a:schemeClr val="accent6"/>
+            </a:lnRef>
+            <a:fillRef idx="3">
+              <a:schemeClr val="accent6"/>
+            </a:fillRef>
+            <a:effectRef idx="3">
+              <a:schemeClr val="accent6"/>
+            </a:effectRef>
+            <a:fontRef idx="minor">
+              <a:schemeClr val="lt1"/>
+            </a:fontRef>
+          </p:style>
+          <p:txBody>
+            <a:bodyPr rtlCol="0" anchor="ctr">
+              <a:scene3d>
+                <a:camera prst="orthographicFront"/>
+                <a:lightRig rig="soft" dir="t">
+                  <a:rot lat="0" lon="0" rev="15600000"/>
+                </a:lightRig>
+              </a:scene3d>
+              <a:sp3d extrusionH="57150" prstMaterial="softEdge">
+                <a:bevelT w="25400" h="38100"/>
+              </a:sp3d>
+            </a:bodyPr>
+            <a:lstStyle/>
+            <a:p>
+              <a:pPr algn="ctr"/>
+              <a:endParaRPr lang="en-US" b="1">
+                <a:ln/>
+                <a:solidFill>
+                  <a:schemeClr val="accent4"/>
+                </a:solidFill>
+              </a:endParaRPr>
+            </a:p>
+          </p:txBody>
+        </p:sp>
+        <p:sp>
+          <p:nvSpPr>
+            <p:cNvPr id="7" name="TextBox 6">
+              <a:extLst>
+                <a:ext uri="{FF2B5EF4-FFF2-40B4-BE49-F238E27FC236}">
+                  <a16:creationId xmlns:a16="http://schemas.microsoft.com/office/drawing/2014/main" id="{B5B7DC3A-9EAF-244D-875C-FAE04D367D4F}"/>
+                </a:ext>
+              </a:extLst>
+            </p:cNvPr>
+            <p:cNvSpPr txBox="1"/>
+            <p:nvPr/>
+          </p:nvSpPr>
+          <p:spPr>
+            <a:xfrm>
+              <a:off x="9150798" y="1791535"/>
+              <a:ext cx="2869568" cy="4524315"/>
+            </a:xfrm>
+            <a:prstGeom prst="rect">
+              <a:avLst/>
+            </a:prstGeom>
+            <a:noFill/>
+          </p:spPr>
+          <p:txBody>
+            <a:bodyPr wrap="square" rtlCol="0">
+              <a:spAutoFit/>
+            </a:bodyPr>
+            <a:lstStyle/>
+            <a:p>
+              <a:r>
+                <a:rPr lang="en-US" dirty="0"/>
+                <a:t>0000 for Register 0</a:t>
+              </a:r>
+            </a:p>
+            <a:p>
+              <a:r>
+                <a:rPr lang="en-US" dirty="0"/>
+                <a:t>0001 for Register 1 </a:t>
+              </a:r>
+            </a:p>
+            <a:p>
+              <a:r>
+                <a:rPr lang="en-US" dirty="0"/>
+                <a:t>0010 for Register 2</a:t>
+              </a:r>
+            </a:p>
+            <a:p>
+              <a:r>
+                <a:rPr lang="en-US" dirty="0"/>
+                <a:t>0011 for Register 3</a:t>
+              </a:r>
+            </a:p>
+            <a:p>
+              <a:r>
+                <a:rPr lang="en-US" dirty="0"/>
+                <a:t>0100 for Register 4</a:t>
+              </a:r>
+            </a:p>
+            <a:p>
+              <a:r>
+                <a:rPr lang="en-US" dirty="0"/>
+                <a:t>0101 for Register 5</a:t>
+              </a:r>
+            </a:p>
+            <a:p>
+              <a:r>
+                <a:rPr lang="en-US" dirty="0"/>
+                <a:t>0110 for Register 6</a:t>
+              </a:r>
+            </a:p>
+            <a:p>
+              <a:r>
+                <a:rPr lang="en-US" dirty="0"/>
+                <a:t>0111 for Register 7</a:t>
+              </a:r>
+            </a:p>
+            <a:p>
+              <a:r>
+                <a:rPr lang="en-US" dirty="0"/>
+                <a:t>1000 for Register 8</a:t>
+              </a:r>
+            </a:p>
+            <a:p>
+              <a:r>
+                <a:rPr lang="en-US" dirty="0"/>
+                <a:t>1001 for Register 9</a:t>
+              </a:r>
+            </a:p>
+            <a:p>
+              <a:r>
+                <a:rPr lang="en-US" dirty="0"/>
+                <a:t>1010 for Register 10</a:t>
+              </a:r>
+            </a:p>
+            <a:p>
+              <a:r>
+                <a:rPr lang="en-US" dirty="0"/>
+                <a:t>1011 for Register 11</a:t>
+              </a:r>
+            </a:p>
+            <a:p>
+              <a:r>
+                <a:rPr lang="en-US" dirty="0"/>
+                <a:t>1100 for Register 12</a:t>
+              </a:r>
+            </a:p>
+            <a:p>
+              <a:r>
+                <a:rPr lang="en-US" dirty="0"/>
+                <a:t>1101 for Register 13</a:t>
+              </a:r>
+            </a:p>
+            <a:p>
+              <a:r>
+                <a:rPr lang="en-US" dirty="0"/>
+                <a:t>1110 for Register 14</a:t>
+              </a:r>
+            </a:p>
+            <a:p>
+              <a:r>
+                <a:rPr lang="en-US" dirty="0"/>
+                <a:t>1111 for Register 15</a:t>
+              </a:r>
+            </a:p>
+          </p:txBody>
+        </p:sp>
+        <p:sp>
+          <p:nvSpPr>
+            <p:cNvPr id="8" name="TextBox 7">
+              <a:extLst>
+                <a:ext uri="{FF2B5EF4-FFF2-40B4-BE49-F238E27FC236}">
+                  <a16:creationId xmlns:a16="http://schemas.microsoft.com/office/drawing/2014/main" id="{F74DCC78-A8E0-9746-A0C2-ABD2C1686796}"/>
+                </a:ext>
+              </a:extLst>
+            </p:cNvPr>
+            <p:cNvSpPr txBox="1"/>
+            <p:nvPr/>
+          </p:nvSpPr>
+          <p:spPr>
+            <a:xfrm>
+              <a:off x="7908026" y="517024"/>
+              <a:ext cx="3153427" cy="540000"/>
+            </a:xfrm>
+            <a:prstGeom prst="rect">
+              <a:avLst/>
+            </a:prstGeom>
+            <a:noFill/>
+            <a:ln w="47625">
+              <a:solidFill>
+                <a:schemeClr val="tx1"/>
+              </a:solidFill>
+            </a:ln>
+          </p:spPr>
+          <p:txBody>
+            <a:bodyPr wrap="square" rtlCol="0">
+              <a:spAutoFit/>
+            </a:bodyPr>
+            <a:lstStyle/>
+            <a:p>
+              <a:endParaRPr lang="en-US" dirty="0"/>
+            </a:p>
+          </p:txBody>
+        </p:sp>
+        <p:sp>
+          <p:nvSpPr>
+            <p:cNvPr id="9" name="TextBox 8">
+              <a:extLst>
+                <a:ext uri="{FF2B5EF4-FFF2-40B4-BE49-F238E27FC236}">
+                  <a16:creationId xmlns:a16="http://schemas.microsoft.com/office/drawing/2014/main" id="{034640F2-2F60-5449-A9F2-C598AFF40BBF}"/>
+                </a:ext>
+              </a:extLst>
+            </p:cNvPr>
+            <p:cNvSpPr txBox="1"/>
+            <p:nvPr/>
+          </p:nvSpPr>
+          <p:spPr>
+            <a:xfrm>
+              <a:off x="7908026" y="517024"/>
+              <a:ext cx="1576714" cy="540000"/>
+            </a:xfrm>
+            <a:prstGeom prst="rect">
+              <a:avLst/>
+            </a:prstGeom>
+            <a:noFill/>
+            <a:ln w="47625">
+              <a:solidFill>
+                <a:schemeClr val="tx1"/>
+              </a:solidFill>
+            </a:ln>
+          </p:spPr>
+          <p:txBody>
+            <a:bodyPr wrap="square" rtlCol="0">
+              <a:spAutoFit/>
+            </a:bodyPr>
+            <a:lstStyle/>
+            <a:p>
+              <a:endParaRPr lang="en-US" dirty="0"/>
+            </a:p>
+          </p:txBody>
+        </p:sp>
+        <p:sp>
+          <p:nvSpPr>
+            <p:cNvPr id="10" name="TextBox 9">
+              <a:extLst>
+                <a:ext uri="{FF2B5EF4-FFF2-40B4-BE49-F238E27FC236}">
+                  <a16:creationId xmlns:a16="http://schemas.microsoft.com/office/drawing/2014/main" id="{B2147DF6-AD7E-1A48-9343-CCFE9BD207F6}"/>
+                </a:ext>
+              </a:extLst>
+            </p:cNvPr>
+            <p:cNvSpPr txBox="1"/>
+            <p:nvPr/>
+          </p:nvSpPr>
+          <p:spPr>
+            <a:xfrm>
+              <a:off x="7908026" y="517024"/>
+              <a:ext cx="788357" cy="540000"/>
+            </a:xfrm>
+            <a:prstGeom prst="rect">
+              <a:avLst/>
+            </a:prstGeom>
+            <a:noFill/>
+            <a:ln w="47625">
+              <a:solidFill>
+                <a:schemeClr val="tx1"/>
+              </a:solidFill>
+            </a:ln>
+          </p:spPr>
+          <p:txBody>
+            <a:bodyPr wrap="square" rtlCol="0">
+              <a:spAutoFit/>
+            </a:bodyPr>
+            <a:lstStyle/>
+            <a:p>
+              <a:endParaRPr lang="en-US" dirty="0"/>
+            </a:p>
+          </p:txBody>
+        </p:sp>
+        <p:sp>
+          <p:nvSpPr>
+            <p:cNvPr id="11" name="TextBox 10">
+              <a:extLst>
+                <a:ext uri="{FF2B5EF4-FFF2-40B4-BE49-F238E27FC236}">
+                  <a16:creationId xmlns:a16="http://schemas.microsoft.com/office/drawing/2014/main" id="{E150D5ED-454A-A743-B928-140372ED3B9A}"/>
+                </a:ext>
+              </a:extLst>
+            </p:cNvPr>
+            <p:cNvSpPr txBox="1"/>
+            <p:nvPr/>
+          </p:nvSpPr>
+          <p:spPr>
+            <a:xfrm>
+              <a:off x="9484740" y="517024"/>
+              <a:ext cx="788357" cy="540000"/>
+            </a:xfrm>
+            <a:prstGeom prst="rect">
+              <a:avLst/>
+            </a:prstGeom>
+            <a:noFill/>
+            <a:ln w="47625">
+              <a:solidFill>
+                <a:schemeClr val="tx1"/>
+              </a:solidFill>
+            </a:ln>
+          </p:spPr>
+          <p:txBody>
+            <a:bodyPr wrap="square" rtlCol="0">
+              <a:spAutoFit/>
+            </a:bodyPr>
+            <a:lstStyle/>
+            <a:p>
+              <a:endParaRPr lang="en-US" dirty="0"/>
+            </a:p>
+          </p:txBody>
+        </p:sp>
+        <p:sp>
+          <p:nvSpPr>
+            <p:cNvPr id="12" name="TextBox 11">
+              <a:extLst>
+                <a:ext uri="{FF2B5EF4-FFF2-40B4-BE49-F238E27FC236}">
+                  <a16:creationId xmlns:a16="http://schemas.microsoft.com/office/drawing/2014/main" id="{D8E51B1F-DF1D-2A40-A8FD-869BF68A0B57}"/>
+                </a:ext>
+              </a:extLst>
+            </p:cNvPr>
+            <p:cNvSpPr txBox="1"/>
+            <p:nvPr/>
+          </p:nvSpPr>
+          <p:spPr>
+            <a:xfrm>
+              <a:off x="7908026" y="517024"/>
+              <a:ext cx="394178" cy="540000"/>
+            </a:xfrm>
+            <a:prstGeom prst="rect">
+              <a:avLst/>
+            </a:prstGeom>
+            <a:noFill/>
+            <a:ln w="47625">
+              <a:solidFill>
+                <a:schemeClr val="tx1"/>
+              </a:solidFill>
+            </a:ln>
+          </p:spPr>
+          <p:txBody>
+            <a:bodyPr wrap="square" rtlCol="0">
+              <a:spAutoFit/>
+            </a:bodyPr>
+            <a:lstStyle/>
+            <a:p>
+              <a:endParaRPr lang="en-US" dirty="0"/>
+            </a:p>
+          </p:txBody>
+        </p:sp>
+        <p:sp>
+          <p:nvSpPr>
+            <p:cNvPr id="13" name="TextBox 12">
+              <a:extLst>
+                <a:ext uri="{FF2B5EF4-FFF2-40B4-BE49-F238E27FC236}">
+                  <a16:creationId xmlns:a16="http://schemas.microsoft.com/office/drawing/2014/main" id="{06FE54DD-6A9E-244A-ADEA-A33CBB35AFB5}"/>
+                </a:ext>
+              </a:extLst>
+            </p:cNvPr>
+            <p:cNvSpPr txBox="1"/>
+            <p:nvPr/>
+          </p:nvSpPr>
+          <p:spPr>
+            <a:xfrm>
+              <a:off x="9090561" y="517024"/>
+              <a:ext cx="788357" cy="540000"/>
+            </a:xfrm>
+            <a:prstGeom prst="rect">
+              <a:avLst/>
+            </a:prstGeom>
+            <a:noFill/>
+            <a:ln w="47625">
+              <a:solidFill>
+                <a:schemeClr val="tx1"/>
+              </a:solidFill>
+            </a:ln>
+          </p:spPr>
+          <p:txBody>
+            <a:bodyPr wrap="square" rtlCol="0">
+              <a:spAutoFit/>
+            </a:bodyPr>
+            <a:lstStyle/>
+            <a:p>
+              <a:endParaRPr lang="en-US" dirty="0"/>
+            </a:p>
+          </p:txBody>
+        </p:sp>
+        <p:sp>
+          <p:nvSpPr>
+            <p:cNvPr id="14" name="TextBox 13">
+              <a:extLst>
+                <a:ext uri="{FF2B5EF4-FFF2-40B4-BE49-F238E27FC236}">
+                  <a16:creationId xmlns:a16="http://schemas.microsoft.com/office/drawing/2014/main" id="{2BC0252B-0E85-9B4C-A08F-B4D2B799E0B5}"/>
+                </a:ext>
+              </a:extLst>
+            </p:cNvPr>
+            <p:cNvSpPr txBox="1"/>
+            <p:nvPr/>
+          </p:nvSpPr>
+          <p:spPr>
+            <a:xfrm>
+              <a:off x="9878918" y="517024"/>
+              <a:ext cx="788357" cy="540000"/>
+            </a:xfrm>
+            <a:prstGeom prst="rect">
+              <a:avLst/>
+            </a:prstGeom>
+            <a:noFill/>
+            <a:ln w="47625">
+              <a:solidFill>
+                <a:schemeClr val="tx1"/>
+              </a:solidFill>
+            </a:ln>
+          </p:spPr>
+          <p:txBody>
+            <a:bodyPr wrap="square" rtlCol="0">
+              <a:spAutoFit/>
+            </a:bodyPr>
+            <a:lstStyle/>
+            <a:p>
+              <a:endParaRPr lang="en-US" dirty="0"/>
+            </a:p>
+          </p:txBody>
+        </p:sp>
+        <p:sp>
+          <p:nvSpPr>
+            <p:cNvPr id="15" name="TextBox 14">
+              <a:extLst>
+                <a:ext uri="{FF2B5EF4-FFF2-40B4-BE49-F238E27FC236}">
+                  <a16:creationId xmlns:a16="http://schemas.microsoft.com/office/drawing/2014/main" id="{DD44DAA3-5164-3E42-8B19-F33C1CB98073}"/>
+                </a:ext>
+              </a:extLst>
+            </p:cNvPr>
+            <p:cNvSpPr txBox="1"/>
+            <p:nvPr/>
+          </p:nvSpPr>
+          <p:spPr>
+            <a:xfrm>
+              <a:off x="7904101" y="494636"/>
+              <a:ext cx="3324999" cy="584775"/>
+            </a:xfrm>
+            <a:prstGeom prst="rect">
+              <a:avLst/>
+            </a:prstGeom>
+            <a:noFill/>
+          </p:spPr>
+          <p:txBody>
+            <a:bodyPr wrap="square" rtlCol="0">
+              <a:spAutoFit/>
+            </a:bodyPr>
+            <a:lstStyle/>
+            <a:p>
+              <a:r>
+                <a:rPr lang="en-US" sz="3200" dirty="0"/>
+                <a:t>0  1  1  0  R</a:t>
+              </a:r>
+              <a:r>
+                <a:rPr lang="en-US" sz="2000" baseline="-25000" dirty="0"/>
+                <a:t> </a:t>
+              </a:r>
+              <a:r>
+                <a:rPr lang="en-US" sz="3200" dirty="0"/>
+                <a:t>  R</a:t>
+              </a:r>
+              <a:r>
+                <a:rPr lang="en-US" sz="3200" baseline="-25000" dirty="0"/>
+                <a:t> </a:t>
+              </a:r>
+              <a:r>
+                <a:rPr lang="en-US" sz="3200" dirty="0"/>
+                <a:t> R</a:t>
+              </a:r>
+              <a:r>
+                <a:rPr lang="en-US" sz="3200" baseline="-25000" dirty="0"/>
+                <a:t> </a:t>
+              </a:r>
+              <a:r>
+                <a:rPr lang="en-US" sz="3200" dirty="0"/>
+                <a:t> R</a:t>
+              </a:r>
+              <a:endParaRPr lang="en-US" sz="3200" baseline="-25000" dirty="0"/>
+            </a:p>
+          </p:txBody>
+        </p:sp>
+        <p:sp>
+          <p:nvSpPr>
+            <p:cNvPr id="16" name="Double Brace 15">
+              <a:extLst>
+                <a:ext uri="{FF2B5EF4-FFF2-40B4-BE49-F238E27FC236}">
+                  <a16:creationId xmlns:a16="http://schemas.microsoft.com/office/drawing/2014/main" id="{FD19FD86-D692-674D-913A-4E440CE76C6F}"/>
+                </a:ext>
+              </a:extLst>
+            </p:cNvPr>
+            <p:cNvSpPr/>
+            <p:nvPr/>
+          </p:nvSpPr>
+          <p:spPr>
+            <a:xfrm rot="16200000">
+              <a:off x="9409201" y="95043"/>
+              <a:ext cx="1373582" cy="1179197"/>
+            </a:xfrm>
+            <a:prstGeom prst="bracePair">
+              <a:avLst/>
+            </a:prstGeom>
+            <a:ln w="38100">
+              <a:solidFill>
+                <a:schemeClr val="tx1">
+                  <a:lumMod val="95000"/>
+                  <a:lumOff val="5000"/>
+                </a:schemeClr>
+              </a:solidFill>
+            </a:ln>
+          </p:spPr>
+          <p:style>
+            <a:lnRef idx="1">
+              <a:schemeClr val="accent1"/>
+            </a:lnRef>
+            <a:fillRef idx="0">
+              <a:schemeClr val="accent1"/>
+            </a:fillRef>
+            <a:effectRef idx="0">
+              <a:schemeClr val="accent1"/>
+            </a:effectRef>
+            <a:fontRef idx="minor">
+              <a:schemeClr val="tx1"/>
+            </a:fontRef>
+          </p:style>
+          <p:txBody>
+            <a:bodyPr rtlCol="0" anchor="ctr"/>
+            <a:lstStyle/>
+            <a:p>
+              <a:pPr algn="ctr"/>
+              <a:endParaRPr lang="en-US"/>
+            </a:p>
+          </p:txBody>
+        </p:sp>
+        <p:sp>
+          <p:nvSpPr>
+            <p:cNvPr id="17" name="TextBox 16">
+              <a:extLst>
+                <a:ext uri="{FF2B5EF4-FFF2-40B4-BE49-F238E27FC236}">
+                  <a16:creationId xmlns:a16="http://schemas.microsoft.com/office/drawing/2014/main" id="{C8F000F5-8A67-9E43-B378-EA0539E126BF}"/>
+                </a:ext>
+              </a:extLst>
+            </p:cNvPr>
+            <p:cNvSpPr txBox="1"/>
+            <p:nvPr/>
+          </p:nvSpPr>
+          <p:spPr>
+            <a:xfrm>
+              <a:off x="9090561" y="-118702"/>
+              <a:ext cx="1946823" cy="540000"/>
+            </a:xfrm>
+            <a:prstGeom prst="rect">
+              <a:avLst/>
+            </a:prstGeom>
+            <a:solidFill>
+              <a:schemeClr val="bg1"/>
+            </a:solidFill>
+            <a:ln w="47625">
+              <a:noFill/>
+            </a:ln>
+          </p:spPr>
+          <p:txBody>
+            <a:bodyPr wrap="square" rtlCol="0">
+              <a:spAutoFit/>
+            </a:bodyPr>
+            <a:lstStyle/>
+            <a:p>
+              <a:endParaRPr lang="en-US" dirty="0"/>
+            </a:p>
+          </p:txBody>
+        </p:sp>
+      </p:grpSp>
+      <p:cxnSp>
+        <p:nvCxnSpPr>
+          <p:cNvPr id="26" name="Straight Connector 25">
+            <a:extLst>
+              <a:ext uri="{FF2B5EF4-FFF2-40B4-BE49-F238E27FC236}">
+                <a16:creationId xmlns:a16="http://schemas.microsoft.com/office/drawing/2014/main" id="{B037EF98-B4D9-6F43-9D34-ECA22F8E3D2E}"/>
+              </a:ext>
+            </a:extLst>
+          </p:cNvPr>
+          <p:cNvCxnSpPr>
+            <a:cxnSpLocks/>
+          </p:cNvCxnSpPr>
+          <p:nvPr/>
+        </p:nvCxnSpPr>
+        <p:spPr>
+          <a:xfrm>
+            <a:off x="7335982" y="-156754"/>
+            <a:ext cx="0" cy="7053943"/>
+          </a:xfrm>
+          <a:prstGeom prst="line">
+            <a:avLst/>
+          </a:prstGeom>
+          <a:ln w="63500">
+            <a:solidFill>
+              <a:schemeClr val="tx1"/>
+            </a:solidFill>
+          </a:ln>
+        </p:spPr>
+        <p:style>
+          <a:lnRef idx="1">
+            <a:schemeClr val="accent1"/>
+          </a:lnRef>
+          <a:fillRef idx="0">
+            <a:schemeClr val="accent1"/>
+          </a:fillRef>
+          <a:effectRef idx="0">
+            <a:schemeClr val="accent1"/>
+          </a:effectRef>
+          <a:fontRef idx="minor">
+            <a:schemeClr val="tx1"/>
+          </a:fontRef>
+        </p:style>
+      </p:cxnSp>
+      <p:sp>
+        <p:nvSpPr>
+          <p:cNvPr id="22" name="TextBox 21">
+            <a:extLst>
+              <a:ext uri="{FF2B5EF4-FFF2-40B4-BE49-F238E27FC236}">
+                <a16:creationId xmlns:a16="http://schemas.microsoft.com/office/drawing/2014/main" id="{12A78311-214F-074C-BF2B-8A167B49EB6D}"/>
+              </a:ext>
+            </a:extLst>
+          </p:cNvPr>
+          <p:cNvSpPr txBox="1"/>
+          <p:nvPr/>
+        </p:nvSpPr>
+        <p:spPr>
+          <a:xfrm>
+            <a:off x="5276041" y="6386877"/>
+            <a:ext cx="1576714" cy="369332"/>
+          </a:xfrm>
+          <a:prstGeom prst="rect">
+            <a:avLst/>
+          </a:prstGeom>
+          <a:noFill/>
+          <a:ln w="47625">
+            <a:solidFill>
+              <a:schemeClr val="tx1"/>
+            </a:solidFill>
+          </a:ln>
+        </p:spPr>
+        <p:txBody>
+          <a:bodyPr wrap="square" rtlCol="0">
+            <a:spAutoFit/>
+          </a:bodyPr>
+          <a:lstStyle/>
+          <a:p>
+            <a:endParaRPr lang="en-US" dirty="0"/>
+          </a:p>
+        </p:txBody>
+      </p:sp>
+      <p:grpSp>
+        <p:nvGrpSpPr>
+          <p:cNvPr id="35" name="Group 34">
+            <a:extLst>
+              <a:ext uri="{FF2B5EF4-FFF2-40B4-BE49-F238E27FC236}">
+                <a16:creationId xmlns:a16="http://schemas.microsoft.com/office/drawing/2014/main" id="{ECC5D612-B5F5-1A44-AF07-871CD1862A95}"/>
+              </a:ext>
+            </a:extLst>
+          </p:cNvPr>
+          <p:cNvGrpSpPr/>
+          <p:nvPr/>
+        </p:nvGrpSpPr>
+        <p:grpSpPr>
+          <a:xfrm>
+            <a:off x="1712460" y="0"/>
+            <a:ext cx="5140296" cy="2448804"/>
+            <a:chOff x="2978604" y="509314"/>
+            <a:chExt cx="5140296" cy="2448804"/>
+          </a:xfrm>
+        </p:grpSpPr>
+        <p:sp>
+          <p:nvSpPr>
+            <p:cNvPr id="36" name="Double Brace 35">
+              <a:extLst>
+                <a:ext uri="{FF2B5EF4-FFF2-40B4-BE49-F238E27FC236}">
+                  <a16:creationId xmlns:a16="http://schemas.microsoft.com/office/drawing/2014/main" id="{94F8AD14-33B4-5F48-AC07-DD5ED99FB800}"/>
+                </a:ext>
+              </a:extLst>
+            </p:cNvPr>
+            <p:cNvSpPr/>
+            <p:nvPr/>
+          </p:nvSpPr>
+          <p:spPr>
+            <a:xfrm rot="16200000">
+              <a:off x="5747317" y="-125799"/>
+              <a:ext cx="1373582" cy="3183811"/>
+            </a:xfrm>
+            <a:prstGeom prst="bracePair">
+              <a:avLst/>
+            </a:prstGeom>
+            <a:ln w="38100">
+              <a:solidFill>
+                <a:schemeClr val="tx1">
+                  <a:lumMod val="95000"/>
+                  <a:lumOff val="5000"/>
+                </a:schemeClr>
+              </a:solidFill>
+            </a:ln>
+          </p:spPr>
+          <p:style>
+            <a:lnRef idx="1">
+              <a:schemeClr val="accent1"/>
+            </a:lnRef>
+            <a:fillRef idx="0">
+              <a:schemeClr val="accent1"/>
+            </a:fillRef>
+            <a:effectRef idx="0">
+              <a:schemeClr val="accent1"/>
+            </a:effectRef>
+            <a:fontRef idx="minor">
+              <a:schemeClr val="tx1"/>
+            </a:fontRef>
+          </p:style>
+          <p:txBody>
+            <a:bodyPr rtlCol="0" anchor="ctr"/>
+            <a:lstStyle/>
+            <a:p>
+              <a:pPr algn="ctr"/>
+              <a:endParaRPr lang="en-US"/>
+            </a:p>
+          </p:txBody>
+        </p:sp>
+        <p:grpSp>
+          <p:nvGrpSpPr>
+            <p:cNvPr id="37" name="Group 36">
+              <a:extLst>
+                <a:ext uri="{FF2B5EF4-FFF2-40B4-BE49-F238E27FC236}">
+                  <a16:creationId xmlns:a16="http://schemas.microsoft.com/office/drawing/2014/main" id="{49F1B100-FED0-5B4D-AC8D-C91F4E52F777}"/>
+                </a:ext>
+              </a:extLst>
+            </p:cNvPr>
+            <p:cNvGrpSpPr/>
+            <p:nvPr/>
+          </p:nvGrpSpPr>
+          <p:grpSpPr>
+            <a:xfrm>
+              <a:off x="2978604" y="509314"/>
+              <a:ext cx="5140296" cy="1329174"/>
+              <a:chOff x="2978604" y="509314"/>
+              <a:chExt cx="5140296" cy="1329174"/>
+            </a:xfrm>
+          </p:grpSpPr>
+          <p:grpSp>
+            <p:nvGrpSpPr>
+              <p:cNvPr id="42" name="Group 41">
+                <a:extLst>
+                  <a:ext uri="{FF2B5EF4-FFF2-40B4-BE49-F238E27FC236}">
+                    <a16:creationId xmlns:a16="http://schemas.microsoft.com/office/drawing/2014/main" id="{ABA1BF4F-18CC-F84D-98EE-074A92F61A75}"/>
+                  </a:ext>
+                </a:extLst>
+              </p:cNvPr>
+              <p:cNvGrpSpPr/>
+              <p:nvPr/>
+            </p:nvGrpSpPr>
+            <p:grpSpPr>
+              <a:xfrm>
+                <a:off x="4842203" y="1298488"/>
+                <a:ext cx="3276697" cy="540000"/>
+                <a:chOff x="1573971" y="1298488"/>
+                <a:chExt cx="3276697" cy="540000"/>
+              </a:xfrm>
+            </p:grpSpPr>
+            <p:grpSp>
+              <p:nvGrpSpPr>
+                <p:cNvPr id="44" name="Group 43">
+                  <a:extLst>
+                    <a:ext uri="{FF2B5EF4-FFF2-40B4-BE49-F238E27FC236}">
+                      <a16:creationId xmlns:a16="http://schemas.microsoft.com/office/drawing/2014/main" id="{39FAFC79-CA42-F340-9B85-E6CCB46FBE4F}"/>
+                    </a:ext>
+                  </a:extLst>
+                </p:cNvPr>
+                <p:cNvGrpSpPr/>
+                <p:nvPr/>
+              </p:nvGrpSpPr>
+              <p:grpSpPr>
+                <a:xfrm>
+                  <a:off x="1604353" y="1298488"/>
+                  <a:ext cx="3153427" cy="540000"/>
+                  <a:chOff x="6267794" y="658408"/>
+                  <a:chExt cx="2880000" cy="540000"/>
+                </a:xfrm>
+              </p:grpSpPr>
+              <p:sp>
+                <p:nvSpPr>
+                  <p:cNvPr id="46" name="TextBox 45">
+                    <a:extLst>
+                      <a:ext uri="{FF2B5EF4-FFF2-40B4-BE49-F238E27FC236}">
+                        <a16:creationId xmlns:a16="http://schemas.microsoft.com/office/drawing/2014/main" id="{520BA237-C405-0C4C-A2D0-E1EFA90C0CE9}"/>
+                      </a:ext>
+                    </a:extLst>
+                  </p:cNvPr>
+                  <p:cNvSpPr txBox="1"/>
+                  <p:nvPr/>
+                </p:nvSpPr>
+                <p:spPr>
+                  <a:xfrm>
+                    <a:off x="6267794" y="658408"/>
+                    <a:ext cx="2880000" cy="540000"/>
+                  </a:xfrm>
+                  <a:prstGeom prst="rect">
+                    <a:avLst/>
+                  </a:prstGeom>
+                  <a:noFill/>
+                  <a:ln w="47625">
+                    <a:solidFill>
+                      <a:schemeClr val="tx1"/>
+                    </a:solidFill>
+                  </a:ln>
+                </p:spPr>
+                <p:txBody>
+                  <a:bodyPr wrap="square" rtlCol="0">
+                    <a:spAutoFit/>
+                  </a:bodyPr>
+                  <a:lstStyle/>
+                  <a:p>
+                    <a:endParaRPr lang="en-US" dirty="0"/>
+                  </a:p>
+                </p:txBody>
+              </p:sp>
+              <p:sp>
+                <p:nvSpPr>
+                  <p:cNvPr id="47" name="TextBox 46">
+                    <a:extLst>
+                      <a:ext uri="{FF2B5EF4-FFF2-40B4-BE49-F238E27FC236}">
+                        <a16:creationId xmlns:a16="http://schemas.microsoft.com/office/drawing/2014/main" id="{67B9E103-E3A5-E648-A388-F367A86EE59E}"/>
+                      </a:ext>
+                    </a:extLst>
+                  </p:cNvPr>
+                  <p:cNvSpPr txBox="1"/>
+                  <p:nvPr/>
+                </p:nvSpPr>
+                <p:spPr>
+                  <a:xfrm>
+                    <a:off x="6267794" y="658408"/>
+                    <a:ext cx="1440000" cy="540000"/>
+                  </a:xfrm>
+                  <a:prstGeom prst="rect">
+                    <a:avLst/>
+                  </a:prstGeom>
+                  <a:noFill/>
+                  <a:ln w="47625">
+                    <a:solidFill>
+                      <a:schemeClr val="tx1"/>
+                    </a:solidFill>
+                  </a:ln>
+                </p:spPr>
+                <p:txBody>
+                  <a:bodyPr wrap="square" rtlCol="0">
+                    <a:spAutoFit/>
+                  </a:bodyPr>
+                  <a:lstStyle/>
+                  <a:p>
+                    <a:endParaRPr lang="en-US" dirty="0"/>
+                  </a:p>
+                </p:txBody>
+              </p:sp>
+              <p:sp>
+                <p:nvSpPr>
+                  <p:cNvPr id="48" name="TextBox 47">
+                    <a:extLst>
+                      <a:ext uri="{FF2B5EF4-FFF2-40B4-BE49-F238E27FC236}">
+                        <a16:creationId xmlns:a16="http://schemas.microsoft.com/office/drawing/2014/main" id="{3172AC68-3F1C-9D44-9C49-D165B4B34E8F}"/>
+                      </a:ext>
+                    </a:extLst>
+                  </p:cNvPr>
+                  <p:cNvSpPr txBox="1"/>
+                  <p:nvPr/>
+                </p:nvSpPr>
+                <p:spPr>
+                  <a:xfrm>
+                    <a:off x="6267794" y="658408"/>
+                    <a:ext cx="720000" cy="540000"/>
+                  </a:xfrm>
+                  <a:prstGeom prst="rect">
+                    <a:avLst/>
+                  </a:prstGeom>
+                  <a:noFill/>
+                  <a:ln w="47625">
+                    <a:solidFill>
+                      <a:schemeClr val="tx1"/>
+                    </a:solidFill>
+                  </a:ln>
+                </p:spPr>
+                <p:txBody>
+                  <a:bodyPr wrap="square" rtlCol="0">
+                    <a:spAutoFit/>
+                  </a:bodyPr>
+                  <a:lstStyle/>
+                  <a:p>
+                    <a:endParaRPr lang="en-US" dirty="0"/>
+                  </a:p>
+                </p:txBody>
+              </p:sp>
+              <p:sp>
+                <p:nvSpPr>
+                  <p:cNvPr id="49" name="TextBox 48">
+                    <a:extLst>
+                      <a:ext uri="{FF2B5EF4-FFF2-40B4-BE49-F238E27FC236}">
+                        <a16:creationId xmlns:a16="http://schemas.microsoft.com/office/drawing/2014/main" id="{04DE0E80-151F-2943-B2BB-E985E6CEB933}"/>
+                      </a:ext>
+                    </a:extLst>
+                  </p:cNvPr>
+                  <p:cNvSpPr txBox="1"/>
+                  <p:nvPr/>
+                </p:nvSpPr>
+                <p:spPr>
+                  <a:xfrm>
+                    <a:off x="7707794" y="658408"/>
+                    <a:ext cx="720000" cy="540000"/>
+                  </a:xfrm>
+                  <a:prstGeom prst="rect">
+                    <a:avLst/>
+                  </a:prstGeom>
+                  <a:noFill/>
+                  <a:ln w="47625">
+                    <a:solidFill>
+                      <a:schemeClr val="tx1"/>
+                    </a:solidFill>
+                  </a:ln>
+                </p:spPr>
+                <p:txBody>
+                  <a:bodyPr wrap="square" rtlCol="0">
+                    <a:spAutoFit/>
+                  </a:bodyPr>
+                  <a:lstStyle/>
+                  <a:p>
+                    <a:endParaRPr lang="en-US" dirty="0"/>
+                  </a:p>
+                </p:txBody>
+              </p:sp>
+              <p:sp>
+                <p:nvSpPr>
+                  <p:cNvPr id="50" name="TextBox 49">
+                    <a:extLst>
+                      <a:ext uri="{FF2B5EF4-FFF2-40B4-BE49-F238E27FC236}">
+                        <a16:creationId xmlns:a16="http://schemas.microsoft.com/office/drawing/2014/main" id="{77F63049-8969-5B40-A553-8A44980A045A}"/>
+                      </a:ext>
+                    </a:extLst>
+                  </p:cNvPr>
+                  <p:cNvSpPr txBox="1"/>
+                  <p:nvPr/>
+                </p:nvSpPr>
+                <p:spPr>
+                  <a:xfrm>
+                    <a:off x="6267794" y="658408"/>
+                    <a:ext cx="360000" cy="540000"/>
+                  </a:xfrm>
+                  <a:prstGeom prst="rect">
+                    <a:avLst/>
+                  </a:prstGeom>
+                  <a:noFill/>
+                  <a:ln w="47625">
+                    <a:solidFill>
+                      <a:schemeClr val="tx1"/>
+                    </a:solidFill>
+                  </a:ln>
+                </p:spPr>
+                <p:txBody>
+                  <a:bodyPr wrap="square" rtlCol="0">
+                    <a:spAutoFit/>
+                  </a:bodyPr>
+                  <a:lstStyle/>
+                  <a:p>
+                    <a:endParaRPr lang="en-US" dirty="0"/>
+                  </a:p>
+                </p:txBody>
+              </p:sp>
+              <p:sp>
+                <p:nvSpPr>
+                  <p:cNvPr id="51" name="TextBox 50">
+                    <a:extLst>
+                      <a:ext uri="{FF2B5EF4-FFF2-40B4-BE49-F238E27FC236}">
+                        <a16:creationId xmlns:a16="http://schemas.microsoft.com/office/drawing/2014/main" id="{79BD86A8-EFC4-AF4C-B2B2-AB9970B0C453}"/>
+                      </a:ext>
+                    </a:extLst>
+                  </p:cNvPr>
+                  <p:cNvSpPr txBox="1"/>
+                  <p:nvPr/>
+                </p:nvSpPr>
+                <p:spPr>
+                  <a:xfrm>
+                    <a:off x="7347794" y="658408"/>
+                    <a:ext cx="720000" cy="540000"/>
+                  </a:xfrm>
+                  <a:prstGeom prst="rect">
+                    <a:avLst/>
+                  </a:prstGeom>
+                  <a:noFill/>
+                  <a:ln w="47625">
+                    <a:solidFill>
+                      <a:schemeClr val="tx1"/>
+                    </a:solidFill>
+                  </a:ln>
+                </p:spPr>
+                <p:txBody>
+                  <a:bodyPr wrap="square" rtlCol="0">
+                    <a:spAutoFit/>
+                  </a:bodyPr>
+                  <a:lstStyle/>
+                  <a:p>
+                    <a:endParaRPr lang="en-US" dirty="0"/>
+                  </a:p>
+                </p:txBody>
+              </p:sp>
+              <p:sp>
+                <p:nvSpPr>
+                  <p:cNvPr id="52" name="TextBox 51">
+                    <a:extLst>
+                      <a:ext uri="{FF2B5EF4-FFF2-40B4-BE49-F238E27FC236}">
+                        <a16:creationId xmlns:a16="http://schemas.microsoft.com/office/drawing/2014/main" id="{B4427196-4F50-4B41-90C8-5F72CCB5AE97}"/>
+                      </a:ext>
+                    </a:extLst>
+                  </p:cNvPr>
+                  <p:cNvSpPr txBox="1"/>
+                  <p:nvPr/>
+                </p:nvSpPr>
+                <p:spPr>
+                  <a:xfrm>
+                    <a:off x="8067794" y="658408"/>
+                    <a:ext cx="720000" cy="540000"/>
+                  </a:xfrm>
+                  <a:prstGeom prst="rect">
+                    <a:avLst/>
+                  </a:prstGeom>
+                  <a:noFill/>
+                  <a:ln w="47625">
+                    <a:solidFill>
+                      <a:schemeClr val="tx1"/>
+                    </a:solidFill>
+                  </a:ln>
+                </p:spPr>
+                <p:txBody>
+                  <a:bodyPr wrap="square" rtlCol="0">
+                    <a:spAutoFit/>
+                  </a:bodyPr>
+                  <a:lstStyle/>
+                  <a:p>
+                    <a:endParaRPr lang="en-US" dirty="0"/>
+                  </a:p>
+                </p:txBody>
+              </p:sp>
+            </p:grpSp>
+            <p:sp>
+              <p:nvSpPr>
+                <p:cNvPr id="45" name="TextBox 44">
+                  <a:extLst>
+                    <a:ext uri="{FF2B5EF4-FFF2-40B4-BE49-F238E27FC236}">
+                      <a16:creationId xmlns:a16="http://schemas.microsoft.com/office/drawing/2014/main" id="{D468C439-9409-E147-9419-E0D063E958A0}"/>
+                    </a:ext>
+                  </a:extLst>
+                </p:cNvPr>
+                <p:cNvSpPr txBox="1"/>
+                <p:nvPr/>
+              </p:nvSpPr>
+              <p:spPr>
+                <a:xfrm>
+                  <a:off x="1573971" y="1298488"/>
+                  <a:ext cx="3276697" cy="523220"/>
+                </a:xfrm>
+                <a:prstGeom prst="rect">
+                  <a:avLst/>
+                </a:prstGeom>
+                <a:noFill/>
+              </p:spPr>
+              <p:txBody>
+                <a:bodyPr wrap="square" rtlCol="0">
+                  <a:spAutoFit/>
+                </a:bodyPr>
+                <a:lstStyle/>
+                <a:p>
+                  <a:r>
+                    <a:rPr lang="en-US" sz="2800" dirty="0"/>
+                    <a:t>A</a:t>
+                  </a:r>
+                  <a:r>
+                    <a:rPr lang="en-US" sz="2000" baseline="-25000" dirty="0"/>
+                    <a:t>2</a:t>
+                  </a:r>
+                  <a:r>
+                    <a:rPr lang="en-US" sz="2800" dirty="0"/>
+                    <a:t> A</a:t>
+                  </a:r>
+                  <a:r>
+                    <a:rPr lang="en-US" sz="2000" baseline="-25000" dirty="0"/>
+                    <a:t>2   </a:t>
+                  </a:r>
+                  <a:r>
+                    <a:rPr lang="en-US" sz="2800" dirty="0"/>
+                    <a:t>A</a:t>
+                  </a:r>
+                  <a:r>
+                    <a:rPr lang="en-US" sz="2000" baseline="-25000" dirty="0"/>
+                    <a:t>2</a:t>
+                  </a:r>
+                  <a:r>
+                    <a:rPr lang="en-US" sz="2800" baseline="-25000" dirty="0"/>
+                    <a:t>  </a:t>
+                  </a:r>
+                  <a:r>
+                    <a:rPr lang="en-US" sz="2800" dirty="0"/>
+                    <a:t>A</a:t>
+                  </a:r>
+                  <a:r>
+                    <a:rPr lang="en-US" sz="2000" baseline="-25000" dirty="0"/>
+                    <a:t>2</a:t>
+                  </a:r>
+                  <a:r>
+                    <a:rPr lang="en-US" sz="2800" baseline="-25000" dirty="0"/>
+                    <a:t>  </a:t>
+                  </a:r>
+                  <a:r>
+                    <a:rPr lang="en-US" sz="2800" dirty="0"/>
+                    <a:t>A</a:t>
+                  </a:r>
+                  <a:r>
+                    <a:rPr lang="en-US" sz="2000" baseline="-25000" dirty="0"/>
+                    <a:t>1</a:t>
+                  </a:r>
+                  <a:r>
+                    <a:rPr lang="en-US" sz="2800" baseline="-25000" dirty="0"/>
+                    <a:t>  </a:t>
+                  </a:r>
+                  <a:r>
+                    <a:rPr lang="en-US" sz="2800" dirty="0"/>
+                    <a:t>A</a:t>
+                  </a:r>
+                  <a:r>
+                    <a:rPr lang="en-US" sz="2000" baseline="-25000" dirty="0"/>
+                    <a:t>1</a:t>
+                  </a:r>
+                  <a:r>
+                    <a:rPr lang="en-US" sz="2800" baseline="-25000" dirty="0"/>
+                    <a:t>  </a:t>
+                  </a:r>
+                  <a:r>
+                    <a:rPr lang="en-US" sz="2800" dirty="0"/>
+                    <a:t>A</a:t>
+                  </a:r>
+                  <a:r>
+                    <a:rPr lang="en-US" sz="2000" baseline="-25000" dirty="0"/>
+                    <a:t>1</a:t>
+                  </a:r>
+                  <a:r>
+                    <a:rPr lang="en-US" sz="2400" baseline="-25000" dirty="0"/>
+                    <a:t> </a:t>
+                  </a:r>
+                  <a:r>
+                    <a:rPr lang="en-US" sz="2800" dirty="0"/>
+                    <a:t>A</a:t>
+                  </a:r>
+                  <a:r>
+                    <a:rPr lang="en-US" sz="2000" baseline="-25000" dirty="0"/>
+                    <a:t>1</a:t>
+                  </a:r>
+                  <a:endParaRPr lang="en-US" sz="2800" baseline="-25000" dirty="0"/>
+                </a:p>
+              </p:txBody>
+            </p:sp>
+          </p:grpSp>
+          <p:sp>
+            <p:nvSpPr>
+              <p:cNvPr id="43" name="TextBox 42">
+                <a:extLst>
+                  <a:ext uri="{FF2B5EF4-FFF2-40B4-BE49-F238E27FC236}">
+                    <a16:creationId xmlns:a16="http://schemas.microsoft.com/office/drawing/2014/main" id="{646F9795-1AFC-B245-8176-B8472FCF76E7}"/>
+                  </a:ext>
+                </a:extLst>
+              </p:cNvPr>
+              <p:cNvSpPr txBox="1"/>
+              <p:nvPr/>
+            </p:nvSpPr>
+            <p:spPr>
+              <a:xfrm>
+                <a:off x="2978604" y="509314"/>
+                <a:ext cx="5047408" cy="540000"/>
+              </a:xfrm>
+              <a:prstGeom prst="rect">
+                <a:avLst/>
+              </a:prstGeom>
+              <a:solidFill>
+                <a:schemeClr val="bg1"/>
+              </a:solidFill>
+              <a:ln w="47625">
+                <a:noFill/>
+              </a:ln>
+            </p:spPr>
+            <p:txBody>
+              <a:bodyPr wrap="square" rtlCol="0">
+                <a:spAutoFit/>
+              </a:bodyPr>
+              <a:lstStyle/>
+              <a:p>
+                <a:endParaRPr lang="en-US" dirty="0"/>
+              </a:p>
+            </p:txBody>
+          </p:sp>
+        </p:grpSp>
+        <p:sp>
+          <p:nvSpPr>
+            <p:cNvPr id="38" name="TextBox 37">
+              <a:extLst>
+                <a:ext uri="{FF2B5EF4-FFF2-40B4-BE49-F238E27FC236}">
+                  <a16:creationId xmlns:a16="http://schemas.microsoft.com/office/drawing/2014/main" id="{D2EFAF1E-F589-674D-8A98-F5A80DAB4B2F}"/>
+                </a:ext>
+              </a:extLst>
+            </p:cNvPr>
+            <p:cNvSpPr txBox="1"/>
+            <p:nvPr/>
+          </p:nvSpPr>
+          <p:spPr>
+            <a:xfrm>
+              <a:off x="4842203" y="2588786"/>
+              <a:ext cx="1520160" cy="369332"/>
+            </a:xfrm>
+            <a:prstGeom prst="rect">
+              <a:avLst/>
+            </a:prstGeom>
+            <a:noFill/>
+          </p:spPr>
+          <p:txBody>
+            <a:bodyPr wrap="none" rtlCol="0">
+              <a:spAutoFit/>
+            </a:bodyPr>
+            <a:lstStyle/>
+            <a:p>
+              <a:r>
+                <a:rPr lang="en-US" dirty="0"/>
+                <a:t>12-bit address</a:t>
+              </a:r>
+            </a:p>
+          </p:txBody>
+        </p:sp>
+        <p:sp>
+          <p:nvSpPr>
+            <p:cNvPr id="39" name="Right Arrow 38">
+              <a:extLst>
+                <a:ext uri="{FF2B5EF4-FFF2-40B4-BE49-F238E27FC236}">
+                  <a16:creationId xmlns:a16="http://schemas.microsoft.com/office/drawing/2014/main" id="{AD04BC02-89E4-A744-B2C1-99BE0C85F7BA}"/>
+                </a:ext>
+              </a:extLst>
+            </p:cNvPr>
+            <p:cNvSpPr/>
+            <p:nvPr/>
+          </p:nvSpPr>
+          <p:spPr>
+            <a:xfrm rot="16200000">
+              <a:off x="5468256" y="2362921"/>
+              <a:ext cx="306893" cy="129746"/>
+            </a:xfrm>
+            <a:prstGeom prst="rightArrow">
+              <a:avLst/>
+            </a:prstGeom>
+          </p:spPr>
+          <p:style>
+            <a:lnRef idx="0">
+              <a:schemeClr val="accent6"/>
+            </a:lnRef>
+            <a:fillRef idx="3">
+              <a:schemeClr val="accent6"/>
+            </a:fillRef>
+            <a:effectRef idx="3">
+              <a:schemeClr val="accent6"/>
+            </a:effectRef>
+            <a:fontRef idx="minor">
+              <a:schemeClr val="lt1"/>
+            </a:fontRef>
+          </p:style>
+          <p:txBody>
+            <a:bodyPr rtlCol="0" anchor="ctr">
+              <a:scene3d>
+                <a:camera prst="orthographicFront"/>
+                <a:lightRig rig="soft" dir="t">
+                  <a:rot lat="0" lon="0" rev="15600000"/>
+                </a:lightRig>
+              </a:scene3d>
+              <a:sp3d extrusionH="57150" prstMaterial="softEdge">
+                <a:bevelT w="25400" h="38100"/>
+              </a:sp3d>
+            </a:bodyPr>
+            <a:lstStyle/>
+            <a:p>
+              <a:pPr algn="ctr"/>
+              <a:endParaRPr lang="en-US" b="1">
+                <a:ln/>
+                <a:solidFill>
+                  <a:schemeClr val="accent4"/>
+                </a:solidFill>
+              </a:endParaRPr>
+            </a:p>
+          </p:txBody>
+        </p:sp>
+      </p:grpSp>
+      <p:grpSp>
+        <p:nvGrpSpPr>
+          <p:cNvPr id="63" name="Group 62">
+            <a:extLst>
+              <a:ext uri="{FF2B5EF4-FFF2-40B4-BE49-F238E27FC236}">
+                <a16:creationId xmlns:a16="http://schemas.microsoft.com/office/drawing/2014/main" id="{481175A5-787F-7242-99C4-F25EA188137A}"/>
+              </a:ext>
+            </a:extLst>
+          </p:cNvPr>
+          <p:cNvGrpSpPr/>
+          <p:nvPr/>
+        </p:nvGrpSpPr>
+        <p:grpSpPr>
+          <a:xfrm>
+            <a:off x="3348026" y="3020436"/>
+            <a:ext cx="884905" cy="1160390"/>
+            <a:chOff x="4547031" y="4518057"/>
+            <a:chExt cx="884905" cy="1160390"/>
+          </a:xfrm>
+        </p:grpSpPr>
+        <p:grpSp>
+          <p:nvGrpSpPr>
+            <p:cNvPr id="64" name="Group 63">
+              <a:extLst>
+                <a:ext uri="{FF2B5EF4-FFF2-40B4-BE49-F238E27FC236}">
+                  <a16:creationId xmlns:a16="http://schemas.microsoft.com/office/drawing/2014/main" id="{5DD70D8D-8E9D-4649-A738-70CBF2170C08}"/>
+                </a:ext>
+              </a:extLst>
+            </p:cNvPr>
+            <p:cNvGrpSpPr/>
+            <p:nvPr/>
+          </p:nvGrpSpPr>
+          <p:grpSpPr>
+            <a:xfrm>
+              <a:off x="4547032" y="4926685"/>
+              <a:ext cx="884904" cy="667015"/>
+              <a:chOff x="4366926" y="4826186"/>
+              <a:chExt cx="884904" cy="667015"/>
+            </a:xfrm>
+          </p:grpSpPr>
+          <p:sp>
+            <p:nvSpPr>
+              <p:cNvPr id="68" name="TextBox 67">
+                <a:extLst>
+                  <a:ext uri="{FF2B5EF4-FFF2-40B4-BE49-F238E27FC236}">
+                    <a16:creationId xmlns:a16="http://schemas.microsoft.com/office/drawing/2014/main" id="{D670EF51-1013-E945-A323-B43EBCEB49AD}"/>
+                  </a:ext>
+                </a:extLst>
+              </p:cNvPr>
+              <p:cNvSpPr txBox="1"/>
+              <p:nvPr/>
+            </p:nvSpPr>
+            <p:spPr>
+              <a:xfrm>
+                <a:off x="4817096" y="4826186"/>
+                <a:ext cx="434734" cy="369332"/>
+              </a:xfrm>
+              <a:prstGeom prst="rect">
+                <a:avLst/>
+              </a:prstGeom>
+              <a:noFill/>
+            </p:spPr>
+            <p:txBody>
+              <a:bodyPr wrap="none" rtlCol="0">
+                <a:spAutoFit/>
+              </a:bodyPr>
+              <a:lstStyle/>
+              <a:p>
+                <a:r>
+                  <a:rPr lang="en-US" dirty="0"/>
+                  <a:t>P</a:t>
+                </a:r>
+                <a:r>
+                  <a:rPr lang="en-US" baseline="-25000" dirty="0"/>
+                  <a:t>M</a:t>
+                </a:r>
+              </a:p>
+            </p:txBody>
+          </p:sp>
+          <p:sp>
+            <p:nvSpPr>
+              <p:cNvPr id="69" name="Right Arrow 68">
+                <a:extLst>
+                  <a:ext uri="{FF2B5EF4-FFF2-40B4-BE49-F238E27FC236}">
+                    <a16:creationId xmlns:a16="http://schemas.microsoft.com/office/drawing/2014/main" id="{AB939C56-F838-C849-AECE-725C8C4F9BA1}"/>
+                  </a:ext>
+                </a:extLst>
+              </p:cNvPr>
+              <p:cNvSpPr/>
+              <p:nvPr/>
+            </p:nvSpPr>
+            <p:spPr>
+              <a:xfrm>
+                <a:off x="4366926" y="4930946"/>
+                <a:ext cx="306893" cy="129746"/>
+              </a:xfrm>
+              <a:prstGeom prst="rightArrow">
+                <a:avLst/>
+              </a:prstGeom>
+            </p:spPr>
+            <p:style>
+              <a:lnRef idx="0">
+                <a:schemeClr val="accent6"/>
+              </a:lnRef>
+              <a:fillRef idx="3">
+                <a:schemeClr val="accent6"/>
+              </a:fillRef>
+              <a:effectRef idx="3">
+                <a:schemeClr val="accent6"/>
+              </a:effectRef>
+              <a:fontRef idx="minor">
+                <a:schemeClr val="lt1"/>
+              </a:fontRef>
+            </p:style>
+            <p:txBody>
+              <a:bodyPr rtlCol="0" anchor="ctr">
+                <a:scene3d>
+                  <a:camera prst="orthographicFront"/>
+                  <a:lightRig rig="soft" dir="t">
+                    <a:rot lat="0" lon="0" rev="15600000"/>
+                  </a:lightRig>
+                </a:scene3d>
+                <a:sp3d extrusionH="57150" prstMaterial="softEdge">
+                  <a:bevelT w="25400" h="38100"/>
+                </a:sp3d>
+              </a:bodyPr>
+              <a:lstStyle/>
+              <a:p>
+                <a:pPr algn="ctr"/>
+                <a:endParaRPr lang="en-US" b="1">
+                  <a:ln/>
+                  <a:solidFill>
+                    <a:schemeClr val="accent4"/>
+                  </a:solidFill>
+                </a:endParaRPr>
+              </a:p>
+            </p:txBody>
+          </p:sp>
+          <p:sp>
+            <p:nvSpPr>
+              <p:cNvPr id="70" name="Right Arrow 69">
+                <a:extLst>
+                  <a:ext uri="{FF2B5EF4-FFF2-40B4-BE49-F238E27FC236}">
+                    <a16:creationId xmlns:a16="http://schemas.microsoft.com/office/drawing/2014/main" id="{BED18F56-8FAE-BA4E-9CFD-84429477C2C6}"/>
+                  </a:ext>
+                </a:extLst>
+              </p:cNvPr>
+              <p:cNvSpPr/>
+              <p:nvPr/>
+            </p:nvSpPr>
+            <p:spPr>
+              <a:xfrm>
+                <a:off x="4366926" y="5363455"/>
+                <a:ext cx="306893" cy="129746"/>
+              </a:xfrm>
+              <a:prstGeom prst="rightArrow">
+                <a:avLst/>
+              </a:prstGeom>
+            </p:spPr>
+            <p:style>
+              <a:lnRef idx="0">
+                <a:schemeClr val="accent6"/>
+              </a:lnRef>
+              <a:fillRef idx="3">
+                <a:schemeClr val="accent6"/>
+              </a:fillRef>
+              <a:effectRef idx="3">
+                <a:schemeClr val="accent6"/>
+              </a:effectRef>
+              <a:fontRef idx="minor">
+                <a:schemeClr val="lt1"/>
+              </a:fontRef>
+            </p:style>
+            <p:txBody>
+              <a:bodyPr rtlCol="0" anchor="ctr">
+                <a:scene3d>
+                  <a:camera prst="orthographicFront"/>
+                  <a:lightRig rig="soft" dir="t">
+                    <a:rot lat="0" lon="0" rev="15600000"/>
+                  </a:lightRig>
+                </a:scene3d>
+                <a:sp3d extrusionH="57150" prstMaterial="softEdge">
+                  <a:bevelT w="25400" h="38100"/>
+                </a:sp3d>
+              </a:bodyPr>
+              <a:lstStyle/>
+              <a:p>
+                <a:pPr algn="ctr"/>
+                <a:endParaRPr lang="en-US" b="1">
+                  <a:ln/>
+                  <a:solidFill>
+                    <a:schemeClr val="accent4"/>
+                  </a:solidFill>
+                </a:endParaRPr>
+              </a:p>
+            </p:txBody>
+          </p:sp>
+        </p:grpSp>
+        <p:sp>
+          <p:nvSpPr>
+            <p:cNvPr id="65" name="TextBox 64">
+              <a:extLst>
+                <a:ext uri="{FF2B5EF4-FFF2-40B4-BE49-F238E27FC236}">
+                  <a16:creationId xmlns:a16="http://schemas.microsoft.com/office/drawing/2014/main" id="{C3721BCC-873A-5848-B0DE-3B24A3B613AE}"/>
+                </a:ext>
+              </a:extLst>
+            </p:cNvPr>
+            <p:cNvSpPr txBox="1"/>
+            <p:nvPr/>
+          </p:nvSpPr>
+          <p:spPr>
+            <a:xfrm>
+              <a:off x="4997202" y="5309115"/>
+              <a:ext cx="367408" cy="369332"/>
+            </a:xfrm>
+            <a:prstGeom prst="rect">
+              <a:avLst/>
+            </a:prstGeom>
+            <a:noFill/>
+          </p:spPr>
+          <p:txBody>
+            <a:bodyPr wrap="none" rtlCol="0">
+              <a:spAutoFit/>
+            </a:bodyPr>
+            <a:lstStyle/>
+            <a:p>
+              <a:r>
+                <a:rPr lang="en-US" dirty="0"/>
+                <a:t>P</a:t>
+              </a:r>
+              <a:r>
+                <a:rPr lang="en-US" baseline="-25000" dirty="0"/>
+                <a:t>L</a:t>
+              </a:r>
+            </a:p>
+          </p:txBody>
+        </p:sp>
+        <p:sp>
+          <p:nvSpPr>
+            <p:cNvPr id="66" name="TextBox 65">
+              <a:extLst>
+                <a:ext uri="{FF2B5EF4-FFF2-40B4-BE49-F238E27FC236}">
+                  <a16:creationId xmlns:a16="http://schemas.microsoft.com/office/drawing/2014/main" id="{771E4AEE-7E55-424C-8B6F-89150F0DE93E}"/>
+                </a:ext>
+              </a:extLst>
+            </p:cNvPr>
+            <p:cNvSpPr txBox="1"/>
+            <p:nvPr/>
+          </p:nvSpPr>
+          <p:spPr>
+            <a:xfrm>
+              <a:off x="4999039" y="4518057"/>
+              <a:ext cx="399468" cy="369332"/>
+            </a:xfrm>
+            <a:prstGeom prst="rect">
+              <a:avLst/>
+            </a:prstGeom>
+            <a:noFill/>
+          </p:spPr>
+          <p:txBody>
+            <a:bodyPr wrap="none" rtlCol="0">
+              <a:spAutoFit/>
+            </a:bodyPr>
+            <a:lstStyle/>
+            <a:p>
+              <a:r>
+                <a:rPr lang="en-US" dirty="0"/>
+                <a:t>P</a:t>
+              </a:r>
+              <a:r>
+                <a:rPr lang="en-US" baseline="-25000" dirty="0"/>
+                <a:t>H</a:t>
+              </a:r>
+            </a:p>
+          </p:txBody>
+        </p:sp>
+        <p:sp>
+          <p:nvSpPr>
+            <p:cNvPr id="67" name="Right Arrow 66">
+              <a:extLst>
+                <a:ext uri="{FF2B5EF4-FFF2-40B4-BE49-F238E27FC236}">
+                  <a16:creationId xmlns:a16="http://schemas.microsoft.com/office/drawing/2014/main" id="{F5291965-D616-5C42-A1EE-1C85D42B16BB}"/>
+                </a:ext>
+              </a:extLst>
+            </p:cNvPr>
+            <p:cNvSpPr/>
+            <p:nvPr/>
+          </p:nvSpPr>
+          <p:spPr>
+            <a:xfrm>
+              <a:off x="4547031" y="4641548"/>
+              <a:ext cx="306893" cy="129746"/>
+            </a:xfrm>
+            <a:prstGeom prst="rightArrow">
+              <a:avLst/>
+            </a:prstGeom>
+          </p:spPr>
+          <p:style>
+            <a:lnRef idx="0">
+              <a:schemeClr val="accent6"/>
+            </a:lnRef>
+            <a:fillRef idx="3">
+              <a:schemeClr val="accent6"/>
+            </a:fillRef>
+            <a:effectRef idx="3">
+              <a:schemeClr val="accent6"/>
+            </a:effectRef>
+            <a:fontRef idx="minor">
+              <a:schemeClr val="lt1"/>
+            </a:fontRef>
+          </p:style>
+          <p:txBody>
+            <a:bodyPr rtlCol="0" anchor="ctr">
+              <a:scene3d>
+                <a:camera prst="orthographicFront"/>
+                <a:lightRig rig="soft" dir="t">
+                  <a:rot lat="0" lon="0" rev="15600000"/>
+                </a:lightRig>
+              </a:scene3d>
+              <a:sp3d extrusionH="57150" prstMaterial="softEdge">
+                <a:bevelT w="25400" h="38100"/>
+              </a:sp3d>
+            </a:bodyPr>
+            <a:lstStyle/>
+            <a:p>
+              <a:pPr algn="ctr"/>
+              <a:endParaRPr lang="en-US" b="1">
+                <a:ln/>
+                <a:solidFill>
+                  <a:schemeClr val="accent4"/>
+                </a:solidFill>
+              </a:endParaRPr>
+            </a:p>
+          </p:txBody>
+        </p:sp>
+      </p:grpSp>
+      <p:sp>
+        <p:nvSpPr>
+          <p:cNvPr id="71" name="Rectangle 70">
+            <a:extLst>
+              <a:ext uri="{FF2B5EF4-FFF2-40B4-BE49-F238E27FC236}">
+                <a16:creationId xmlns:a16="http://schemas.microsoft.com/office/drawing/2014/main" id="{71562554-69DA-ED44-A01A-E86226307CCC}"/>
+              </a:ext>
+            </a:extLst>
+          </p:cNvPr>
+          <p:cNvSpPr/>
+          <p:nvPr/>
+        </p:nvSpPr>
+        <p:spPr>
+          <a:xfrm>
+            <a:off x="2158684" y="3007337"/>
+            <a:ext cx="2304769" cy="369332"/>
+          </a:xfrm>
+          <a:prstGeom prst="rect">
+            <a:avLst/>
+          </a:prstGeom>
+        </p:spPr>
+        <p:txBody>
+          <a:bodyPr wrap="square">
+            <a:spAutoFit/>
+          </a:bodyPr>
+          <a:lstStyle/>
+          <a:p>
+            <a:r>
+              <a:rPr lang="en-US" dirty="0"/>
+              <a:t>A</a:t>
+            </a:r>
+            <a:r>
+              <a:rPr lang="en-US" baseline="-25000" dirty="0"/>
+              <a:t>3 </a:t>
+            </a:r>
+            <a:r>
+              <a:rPr lang="en-US" dirty="0"/>
+              <a:t>A</a:t>
+            </a:r>
+            <a:r>
+              <a:rPr lang="en-US" baseline="-25000" dirty="0"/>
+              <a:t>3</a:t>
+            </a:r>
+            <a:r>
+              <a:rPr lang="en-US" dirty="0"/>
+              <a:t> A</a:t>
+            </a:r>
+            <a:r>
+              <a:rPr lang="en-US" baseline="-25000" dirty="0"/>
+              <a:t>3</a:t>
+            </a:r>
+            <a:r>
+              <a:rPr lang="en-US" dirty="0"/>
+              <a:t> A</a:t>
+            </a:r>
+            <a:r>
+              <a:rPr lang="en-US" baseline="-25000" dirty="0"/>
+              <a:t>3</a:t>
+            </a:r>
+            <a:r>
+              <a:rPr lang="en-US" dirty="0"/>
+              <a:t> </a:t>
+            </a:r>
+          </a:p>
+        </p:txBody>
+      </p:sp>
+      <p:sp>
+        <p:nvSpPr>
+          <p:cNvPr id="72" name="Rectangle 71">
+            <a:extLst>
+              <a:ext uri="{FF2B5EF4-FFF2-40B4-BE49-F238E27FC236}">
+                <a16:creationId xmlns:a16="http://schemas.microsoft.com/office/drawing/2014/main" id="{02E1C655-CD82-9149-AFF3-18DBC8CBA733}"/>
+              </a:ext>
+            </a:extLst>
+          </p:cNvPr>
+          <p:cNvSpPr/>
+          <p:nvPr/>
+        </p:nvSpPr>
+        <p:spPr>
+          <a:xfrm>
+            <a:off x="2158684" y="3408206"/>
+            <a:ext cx="2304769" cy="369332"/>
+          </a:xfrm>
+          <a:prstGeom prst="rect">
+            <a:avLst/>
+          </a:prstGeom>
+        </p:spPr>
+        <p:txBody>
+          <a:bodyPr wrap="square">
+            <a:spAutoFit/>
+          </a:bodyPr>
+          <a:lstStyle/>
+          <a:p>
+            <a:r>
+              <a:rPr lang="en-US" dirty="0"/>
+              <a:t>A</a:t>
+            </a:r>
+            <a:r>
+              <a:rPr lang="en-US" baseline="-25000" dirty="0"/>
+              <a:t>2 </a:t>
+            </a:r>
+            <a:r>
+              <a:rPr lang="en-US" dirty="0"/>
+              <a:t>A</a:t>
+            </a:r>
+            <a:r>
+              <a:rPr lang="en-US" baseline="-25000" dirty="0"/>
+              <a:t>2</a:t>
+            </a:r>
+            <a:r>
+              <a:rPr lang="en-US" dirty="0"/>
+              <a:t> A</a:t>
+            </a:r>
+            <a:r>
+              <a:rPr lang="en-US" baseline="-25000" dirty="0"/>
+              <a:t>2</a:t>
+            </a:r>
+            <a:r>
+              <a:rPr lang="en-US" dirty="0"/>
+              <a:t> A</a:t>
+            </a:r>
+            <a:r>
+              <a:rPr lang="en-US" baseline="-25000" dirty="0"/>
+              <a:t>2</a:t>
+            </a:r>
+            <a:r>
+              <a:rPr lang="en-US" dirty="0"/>
+              <a:t> </a:t>
+            </a:r>
+          </a:p>
+        </p:txBody>
+      </p:sp>
+      <p:sp>
+        <p:nvSpPr>
+          <p:cNvPr id="73" name="Rectangle 72">
+            <a:extLst>
+              <a:ext uri="{FF2B5EF4-FFF2-40B4-BE49-F238E27FC236}">
+                <a16:creationId xmlns:a16="http://schemas.microsoft.com/office/drawing/2014/main" id="{DFC518CF-47C5-4C41-B7E5-E29CC13F3A00}"/>
+              </a:ext>
+            </a:extLst>
+          </p:cNvPr>
+          <p:cNvSpPr/>
+          <p:nvPr/>
+        </p:nvSpPr>
+        <p:spPr>
+          <a:xfrm>
+            <a:off x="2158684" y="3801960"/>
+            <a:ext cx="2304769" cy="369332"/>
+          </a:xfrm>
+          <a:prstGeom prst="rect">
+            <a:avLst/>
+          </a:prstGeom>
+        </p:spPr>
+        <p:txBody>
+          <a:bodyPr wrap="square">
+            <a:spAutoFit/>
+          </a:bodyPr>
+          <a:lstStyle/>
+          <a:p>
+            <a:r>
+              <a:rPr lang="en-US" dirty="0"/>
+              <a:t>A</a:t>
+            </a:r>
+            <a:r>
+              <a:rPr lang="en-US" baseline="-25000" dirty="0"/>
+              <a:t>1 </a:t>
+            </a:r>
+            <a:r>
+              <a:rPr lang="en-US" dirty="0"/>
+              <a:t>A</a:t>
+            </a:r>
+            <a:r>
+              <a:rPr lang="en-US" baseline="-25000" dirty="0"/>
+              <a:t>1</a:t>
+            </a:r>
+            <a:r>
+              <a:rPr lang="en-US" dirty="0"/>
+              <a:t> A</a:t>
+            </a:r>
+            <a:r>
+              <a:rPr lang="en-US" baseline="-25000" dirty="0"/>
+              <a:t>1</a:t>
+            </a:r>
+            <a:r>
+              <a:rPr lang="en-US" dirty="0"/>
+              <a:t> A</a:t>
+            </a:r>
+            <a:r>
+              <a:rPr lang="en-US" baseline="-25000" dirty="0"/>
+              <a:t>1</a:t>
+            </a:r>
+            <a:r>
+              <a:rPr lang="en-US" dirty="0"/>
+              <a:t> </a:t>
+            </a:r>
+          </a:p>
+        </p:txBody>
+      </p:sp>
+      <p:sp>
+        <p:nvSpPr>
+          <p:cNvPr id="61" name="Rectangle 60">
+            <a:extLst>
+              <a:ext uri="{FF2B5EF4-FFF2-40B4-BE49-F238E27FC236}">
+                <a16:creationId xmlns:a16="http://schemas.microsoft.com/office/drawing/2014/main" id="{CB068ACE-0122-F544-9C5B-4DF95C142F35}"/>
+              </a:ext>
+            </a:extLst>
+          </p:cNvPr>
+          <p:cNvSpPr/>
+          <p:nvPr/>
+        </p:nvSpPr>
+        <p:spPr>
+          <a:xfrm>
+            <a:off x="585468" y="5631808"/>
+            <a:ext cx="3337313" cy="369332"/>
+          </a:xfrm>
+          <a:prstGeom prst="rect">
+            <a:avLst/>
+          </a:prstGeom>
+        </p:spPr>
+        <p:txBody>
+          <a:bodyPr wrap="square">
+            <a:spAutoFit/>
+          </a:bodyPr>
+          <a:lstStyle/>
+          <a:p>
+            <a:r>
+              <a:rPr lang="en-US" dirty="0"/>
+              <a:t>( (P</a:t>
+            </a:r>
+            <a:r>
+              <a:rPr lang="en-US" baseline="-25000" dirty="0"/>
+              <a:t>H</a:t>
+            </a:r>
+            <a:r>
+              <a:rPr lang="en-US" dirty="0"/>
+              <a:t>) . (R</a:t>
+            </a:r>
+            <a:r>
+              <a:rPr lang="en-US" baseline="-25000" dirty="0"/>
+              <a:t>0</a:t>
+            </a:r>
+            <a:r>
+              <a:rPr lang="en-US" dirty="0"/>
+              <a:t>) . (R</a:t>
+            </a:r>
+            <a:r>
+              <a:rPr lang="en-US" baseline="-25000" dirty="0"/>
+              <a:t>1</a:t>
+            </a:r>
+            <a:r>
+              <a:rPr lang="en-US" dirty="0"/>
+              <a:t>) )          </a:t>
+            </a:r>
+            <a:r>
+              <a:rPr lang="en-US" dirty="0" err="1"/>
+              <a:t>RP</a:t>
+            </a:r>
+            <a:r>
+              <a:rPr lang="en-US" baseline="-25000" dirty="0" err="1"/>
+              <a:t>p</a:t>
+            </a:r>
+            <a:endParaRPr lang="en-US" dirty="0"/>
+          </a:p>
+        </p:txBody>
+      </p:sp>
+      <p:sp>
+        <p:nvSpPr>
+          <p:cNvPr id="62" name="Right Arrow 61">
+            <a:extLst>
+              <a:ext uri="{FF2B5EF4-FFF2-40B4-BE49-F238E27FC236}">
+                <a16:creationId xmlns:a16="http://schemas.microsoft.com/office/drawing/2014/main" id="{0DFF2C6C-00C7-E54F-BD57-E4527A744C93}"/>
+              </a:ext>
+            </a:extLst>
+          </p:cNvPr>
+          <p:cNvSpPr/>
+          <p:nvPr/>
+        </p:nvSpPr>
+        <p:spPr>
+          <a:xfrm>
+            <a:off x="2400574" y="5762614"/>
+            <a:ext cx="306893" cy="129746"/>
+          </a:xfrm>
+          <a:prstGeom prst="rightArrow">
+            <a:avLst/>
+          </a:prstGeom>
+        </p:spPr>
+        <p:style>
+          <a:lnRef idx="0">
+            <a:schemeClr val="accent6"/>
+          </a:lnRef>
+          <a:fillRef idx="3">
+            <a:schemeClr val="accent6"/>
+          </a:fillRef>
+          <a:effectRef idx="3">
+            <a:schemeClr val="accent6"/>
+          </a:effectRef>
+          <a:fontRef idx="minor">
+            <a:schemeClr val="lt1"/>
+          </a:fontRef>
+        </p:style>
+        <p:txBody>
+          <a:bodyPr rtlCol="0" anchor="ctr">
+            <a:scene3d>
+              <a:camera prst="orthographicFront"/>
+              <a:lightRig rig="soft" dir="t">
+                <a:rot lat="0" lon="0" rev="15600000"/>
+              </a:lightRig>
+            </a:scene3d>
+            <a:sp3d extrusionH="57150" prstMaterial="softEdge">
+              <a:bevelT w="25400" h="38100"/>
+            </a:sp3d>
+          </a:bodyPr>
+          <a:lstStyle/>
+          <a:p>
+            <a:pPr algn="ctr"/>
+            <a:endParaRPr lang="en-US" b="1">
+              <a:ln/>
+              <a:solidFill>
+                <a:schemeClr val="accent4"/>
+              </a:solidFill>
+            </a:endParaRPr>
+          </a:p>
+        </p:txBody>
+      </p:sp>
+      <p:sp>
+        <p:nvSpPr>
+          <p:cNvPr id="74" name="Rectangle 73">
+            <a:extLst>
+              <a:ext uri="{FF2B5EF4-FFF2-40B4-BE49-F238E27FC236}">
+                <a16:creationId xmlns:a16="http://schemas.microsoft.com/office/drawing/2014/main" id="{2DA033E7-6424-7046-8E07-8C497D262C48}"/>
+              </a:ext>
+            </a:extLst>
+          </p:cNvPr>
+          <p:cNvSpPr/>
+          <p:nvPr/>
+        </p:nvSpPr>
+        <p:spPr>
+          <a:xfrm>
+            <a:off x="409634" y="6291505"/>
+            <a:ext cx="3548055" cy="369332"/>
+          </a:xfrm>
+          <a:prstGeom prst="rect">
+            <a:avLst/>
+          </a:prstGeom>
+        </p:spPr>
+        <p:txBody>
+          <a:bodyPr wrap="square">
+            <a:spAutoFit/>
+          </a:bodyPr>
+          <a:lstStyle/>
+          <a:p>
+            <a:r>
+              <a:rPr lang="en-US" dirty="0"/>
+              <a:t>( (P</a:t>
+            </a:r>
+            <a:r>
+              <a:rPr lang="en-US" baseline="-25000" dirty="0"/>
+              <a:t>H+1</a:t>
+            </a:r>
+            <a:r>
+              <a:rPr lang="en-US" dirty="0"/>
+              <a:t>) . (R</a:t>
+            </a:r>
+            <a:r>
+              <a:rPr lang="en-US" baseline="-25000" dirty="0"/>
+              <a:t>0</a:t>
+            </a:r>
+            <a:r>
+              <a:rPr lang="en-US" dirty="0"/>
+              <a:t>) . (R</a:t>
+            </a:r>
+            <a:r>
+              <a:rPr lang="en-US" baseline="-25000" dirty="0"/>
+              <a:t>1</a:t>
+            </a:r>
+            <a:r>
+              <a:rPr lang="en-US" dirty="0"/>
+              <a:t>) )          </a:t>
+            </a:r>
+            <a:r>
+              <a:rPr lang="en-US" dirty="0" err="1"/>
+              <a:t>RP</a:t>
+            </a:r>
+            <a:r>
+              <a:rPr lang="en-US" baseline="-25000" dirty="0" err="1"/>
+              <a:t>p</a:t>
+            </a:r>
+            <a:endParaRPr lang="en-US" dirty="0"/>
+          </a:p>
+        </p:txBody>
+      </p:sp>
+      <p:sp>
+        <p:nvSpPr>
+          <p:cNvPr id="75" name="Right Arrow 74">
+            <a:extLst>
+              <a:ext uri="{FF2B5EF4-FFF2-40B4-BE49-F238E27FC236}">
+                <a16:creationId xmlns:a16="http://schemas.microsoft.com/office/drawing/2014/main" id="{8FBCE37F-B207-3B42-8444-42C030DB13AD}"/>
+              </a:ext>
+            </a:extLst>
+          </p:cNvPr>
+          <p:cNvSpPr/>
+          <p:nvPr/>
+        </p:nvSpPr>
+        <p:spPr>
+          <a:xfrm>
+            <a:off x="2400574" y="6425893"/>
+            <a:ext cx="306893" cy="129746"/>
+          </a:xfrm>
+          <a:prstGeom prst="rightArrow">
+            <a:avLst/>
+          </a:prstGeom>
+        </p:spPr>
+        <p:style>
+          <a:lnRef idx="0">
+            <a:schemeClr val="accent6"/>
+          </a:lnRef>
+          <a:fillRef idx="3">
+            <a:schemeClr val="accent6"/>
+          </a:fillRef>
+          <a:effectRef idx="3">
+            <a:schemeClr val="accent6"/>
+          </a:effectRef>
+          <a:fontRef idx="minor">
+            <a:schemeClr val="lt1"/>
+          </a:fontRef>
+        </p:style>
+        <p:txBody>
+          <a:bodyPr rtlCol="0" anchor="ctr">
+            <a:scene3d>
+              <a:camera prst="orthographicFront"/>
+              <a:lightRig rig="soft" dir="t">
+                <a:rot lat="0" lon="0" rev="15600000"/>
+              </a:lightRig>
+            </a:scene3d>
+            <a:sp3d extrusionH="57150" prstMaterial="softEdge">
+              <a:bevelT w="25400" h="38100"/>
+            </a:sp3d>
+          </a:bodyPr>
+          <a:lstStyle/>
+          <a:p>
+            <a:pPr algn="ctr"/>
+            <a:endParaRPr lang="en-US" b="1">
+              <a:ln/>
+              <a:solidFill>
+                <a:schemeClr val="accent4"/>
+              </a:solidFill>
+            </a:endParaRPr>
+          </a:p>
+        </p:txBody>
+      </p:sp>
+      <p:sp>
+        <p:nvSpPr>
+          <p:cNvPr id="80" name="TextBox 79">
+            <a:extLst>
+              <a:ext uri="{FF2B5EF4-FFF2-40B4-BE49-F238E27FC236}">
+                <a16:creationId xmlns:a16="http://schemas.microsoft.com/office/drawing/2014/main" id="{98D93FF9-4288-3E4D-9F8E-4ED161C5D945}"/>
+              </a:ext>
+            </a:extLst>
+          </p:cNvPr>
+          <p:cNvSpPr txBox="1"/>
+          <p:nvPr/>
+        </p:nvSpPr>
+        <p:spPr>
+          <a:xfrm>
+            <a:off x="201760" y="5998635"/>
+            <a:ext cx="461986" cy="369332"/>
+          </a:xfrm>
+          <a:prstGeom prst="rect">
+            <a:avLst/>
+          </a:prstGeom>
+          <a:noFill/>
+        </p:spPr>
+        <p:txBody>
+          <a:bodyPr wrap="none" rtlCol="0">
+            <a:spAutoFit/>
+          </a:bodyPr>
+          <a:lstStyle/>
+          <a:p>
+            <a:r>
+              <a:rPr lang="en-US" dirty="0"/>
+              <a:t>OR</a:t>
+            </a:r>
+          </a:p>
+        </p:txBody>
+      </p:sp>
+      <p:grpSp>
+        <p:nvGrpSpPr>
+          <p:cNvPr id="92" name="Group 91">
+            <a:extLst>
+              <a:ext uri="{FF2B5EF4-FFF2-40B4-BE49-F238E27FC236}">
+                <a16:creationId xmlns:a16="http://schemas.microsoft.com/office/drawing/2014/main" id="{38C99C44-8E69-3C49-B544-C478CFB06405}"/>
+              </a:ext>
+            </a:extLst>
+          </p:cNvPr>
+          <p:cNvGrpSpPr/>
+          <p:nvPr/>
+        </p:nvGrpSpPr>
+        <p:grpSpPr>
+          <a:xfrm>
+            <a:off x="8893591" y="6425893"/>
+            <a:ext cx="955203" cy="369332"/>
+            <a:chOff x="4547031" y="4509216"/>
+            <a:chExt cx="955203" cy="369332"/>
+          </a:xfrm>
+        </p:grpSpPr>
+        <p:sp>
+          <p:nvSpPr>
+            <p:cNvPr id="93" name="TextBox 92">
+              <a:extLst>
+                <a:ext uri="{FF2B5EF4-FFF2-40B4-BE49-F238E27FC236}">
+                  <a16:creationId xmlns:a16="http://schemas.microsoft.com/office/drawing/2014/main" id="{81C32892-494E-A049-82C9-3FEC80CBCCFD}"/>
+                </a:ext>
+              </a:extLst>
+            </p:cNvPr>
+            <p:cNvSpPr txBox="1"/>
+            <p:nvPr/>
+          </p:nvSpPr>
+          <p:spPr>
+            <a:xfrm>
+              <a:off x="4817431" y="4509216"/>
+              <a:ext cx="684803" cy="369332"/>
+            </a:xfrm>
+            <a:prstGeom prst="rect">
+              <a:avLst/>
+            </a:prstGeom>
+            <a:noFill/>
+          </p:spPr>
+          <p:txBody>
+            <a:bodyPr wrap="none" rtlCol="0">
+              <a:spAutoFit/>
+            </a:bodyPr>
+            <a:lstStyle/>
+            <a:p>
+              <a:r>
+                <a:rPr lang="en-US" dirty="0"/>
+                <a:t>RRRR</a:t>
+              </a:r>
+              <a:endParaRPr lang="en-US" baseline="-25000" dirty="0"/>
+            </a:p>
+          </p:txBody>
+        </p:sp>
+        <p:sp>
+          <p:nvSpPr>
+            <p:cNvPr id="94" name="Right Arrow 93">
+              <a:extLst>
+                <a:ext uri="{FF2B5EF4-FFF2-40B4-BE49-F238E27FC236}">
+                  <a16:creationId xmlns:a16="http://schemas.microsoft.com/office/drawing/2014/main" id="{03CB11C9-1630-4D4E-A880-8A33C77FF6E4}"/>
+                </a:ext>
+              </a:extLst>
+            </p:cNvPr>
+            <p:cNvSpPr/>
+            <p:nvPr/>
+          </p:nvSpPr>
+          <p:spPr>
+            <a:xfrm>
+              <a:off x="4547031" y="4619776"/>
+              <a:ext cx="306893" cy="129746"/>
+            </a:xfrm>
+            <a:prstGeom prst="rightArrow">
+              <a:avLst/>
+            </a:prstGeom>
+          </p:spPr>
+          <p:style>
+            <a:lnRef idx="0">
+              <a:schemeClr val="accent6"/>
+            </a:lnRef>
+            <a:fillRef idx="3">
+              <a:schemeClr val="accent6"/>
+            </a:fillRef>
+            <a:effectRef idx="3">
+              <a:schemeClr val="accent6"/>
+            </a:effectRef>
+            <a:fontRef idx="minor">
+              <a:schemeClr val="lt1"/>
+            </a:fontRef>
+          </p:style>
+          <p:txBody>
+            <a:bodyPr rtlCol="0" anchor="ctr">
+              <a:scene3d>
+                <a:camera prst="orthographicFront"/>
+                <a:lightRig rig="soft" dir="t">
+                  <a:rot lat="0" lon="0" rev="15600000"/>
+                </a:lightRig>
+              </a:scene3d>
+              <a:sp3d extrusionH="57150" prstMaterial="softEdge">
+                <a:bevelT w="25400" h="38100"/>
+              </a:sp3d>
+            </a:bodyPr>
+            <a:lstStyle/>
+            <a:p>
+              <a:pPr algn="ctr"/>
+              <a:endParaRPr lang="en-US" b="1">
+                <a:ln/>
+                <a:solidFill>
+                  <a:schemeClr val="accent4"/>
+                </a:solidFill>
+              </a:endParaRPr>
+            </a:p>
+          </p:txBody>
+        </p:sp>
+      </p:grpSp>
+      <p:sp>
+        <p:nvSpPr>
+          <p:cNvPr id="95" name="Rectangle 94">
+            <a:extLst>
+              <a:ext uri="{FF2B5EF4-FFF2-40B4-BE49-F238E27FC236}">
+                <a16:creationId xmlns:a16="http://schemas.microsoft.com/office/drawing/2014/main" id="{A2074F0C-5E4B-DA45-B46B-EF3388966E9E}"/>
+              </a:ext>
+            </a:extLst>
+          </p:cNvPr>
+          <p:cNvSpPr/>
+          <p:nvPr/>
+        </p:nvSpPr>
+        <p:spPr>
+          <a:xfrm>
+            <a:off x="7741207" y="6411602"/>
+            <a:ext cx="2304769" cy="369332"/>
+          </a:xfrm>
+          <a:prstGeom prst="rect">
+            <a:avLst/>
+          </a:prstGeom>
+        </p:spPr>
+        <p:txBody>
+          <a:bodyPr wrap="square">
+            <a:spAutoFit/>
+          </a:bodyPr>
+          <a:lstStyle/>
+          <a:p>
+            <a:r>
+              <a:rPr lang="en-US" dirty="0"/>
+              <a:t>(RRRR) + 1 </a:t>
+            </a:r>
+          </a:p>
+        </p:txBody>
+      </p:sp>
+    </p:spTree>
+    <p:extLst>
+      <p:ext uri="{BB962C8B-B14F-4D97-AF65-F5344CB8AC3E}">
+        <p14:creationId xmlns:p14="http://schemas.microsoft.com/office/powerpoint/2010/main" val="316440167"/>
+      </p:ext>
+    </p:extLst>
+  </p:cSld>
+  <p:clrMapOvr>
+    <a:masterClrMapping/>
+  </p:clrMapOvr>
+</p:sld>
+</file>
+
+<file path=ppt/slides/slide11.xml><?xml version="1.0" encoding="utf-8"?>
 <p:sld xmlns:a="http://schemas.openxmlformats.org/drawingml/2006/main" xmlns:r="http://schemas.openxmlformats.org/officeDocument/2006/relationships" xmlns:p="http://schemas.openxmlformats.org/presentationml/2006/main">
   <p:cSld>
     <p:spTree>
@@ -8599,7 +10976,7 @@
 </p:sld>
 </file>
 
-<file path=ppt/slides/slide11.xml><?xml version="1.0" encoding="utf-8"?>
+<file path=ppt/slides/slide12.xml><?xml version="1.0" encoding="utf-8"?>
 <p:sld xmlns:a="http://schemas.openxmlformats.org/drawingml/2006/main" xmlns:r="http://schemas.openxmlformats.org/officeDocument/2006/relationships" xmlns:p="http://schemas.openxmlformats.org/presentationml/2006/main">
   <p:cSld>
     <p:spTree>
@@ -13184,7 +15561,7 @@
 </p:sld>
 </file>
 
-<file path=ppt/slides/slide12.xml><?xml version="1.0" encoding="utf-8"?>
+<file path=ppt/slides/slide13.xml><?xml version="1.0" encoding="utf-8"?>
 <p:sld xmlns:a="http://schemas.openxmlformats.org/drawingml/2006/main" xmlns:r="http://schemas.openxmlformats.org/officeDocument/2006/relationships" xmlns:p="http://schemas.openxmlformats.org/presentationml/2006/main">
   <p:cSld>
     <p:spTree>
@@ -17517,7 +19894,7 @@
 </p:sld>
 </file>
 
-<file path=ppt/slides/slide13.xml><?xml version="1.0" encoding="utf-8"?>
+<file path=ppt/slides/slide14.xml><?xml version="1.0" encoding="utf-8"?>
 <p:sld xmlns:a="http://schemas.openxmlformats.org/drawingml/2006/main" xmlns:r="http://schemas.openxmlformats.org/officeDocument/2006/relationships" xmlns:p="http://schemas.openxmlformats.org/presentationml/2006/main">
   <p:cSld>
     <p:spTree>

</xml_diff>

<commit_message>
Feature/test opcode 235 adm (#49)
* Fixed syntax issues

* Format code with autopep8

* Clean-up of ADM tests

* Format code with autopep8

Co-authored-by: deepsource-autofix[bot] <62050782+deepsource-autofix[bot]@users.noreply.github.com>
</commit_message>
<xml_diff>
--- a/pyntel4004/docs/resources.pptx
+++ b/pyntel4004/docs/resources.pptx
@@ -5,7 +5,7 @@
     <p:sldMasterId id="2147483648" r:id="rId1"/>
   </p:sldMasterIdLst>
   <p:notesMasterIdLst>
-    <p:notesMasterId r:id="rId15"/>
+    <p:notesMasterId r:id="rId16"/>
   </p:notesMasterIdLst>
   <p:sldIdLst>
     <p:sldId id="288" r:id="rId2"/>
@@ -17,10 +17,11 @@
     <p:sldId id="287" r:id="rId8"/>
     <p:sldId id="289" r:id="rId9"/>
     <p:sldId id="290" r:id="rId10"/>
-    <p:sldId id="280" r:id="rId11"/>
-    <p:sldId id="282" r:id="rId12"/>
-    <p:sldId id="284" r:id="rId13"/>
-    <p:sldId id="283" r:id="rId14"/>
+    <p:sldId id="292" r:id="rId11"/>
+    <p:sldId id="280" r:id="rId12"/>
+    <p:sldId id="282" r:id="rId13"/>
+    <p:sldId id="284" r:id="rId14"/>
+    <p:sldId id="283" r:id="rId15"/>
   </p:sldIdLst>
   <p:sldSz cx="12192000" cy="6858000"/>
   <p:notesSz cx="6858000" cy="9144000"/>
@@ -221,7 +222,7 @@
           <a:p>
             <a:fld id="{0E6D88F6-2DDA-CB4F-91F4-9B525386DD76}" type="datetimeFigureOut">
               <a:rPr lang="en-US" smtClean="0"/>
-              <a:t>7/7/21</a:t>
+              <a:t>9/9/21</a:t>
             </a:fld>
             <a:endParaRPr lang="en-US"/>
           </a:p>
@@ -657,7 +658,7 @@
           <a:p>
             <a:fld id="{D651246A-AA0D-1344-AACC-8A747329776B}" type="datetimeFigureOut">
               <a:rPr lang="en-US" smtClean="0"/>
-              <a:t>7/7/21</a:t>
+              <a:t>9/9/21</a:t>
             </a:fld>
             <a:endParaRPr lang="en-US"/>
           </a:p>
@@ -857,7 +858,7 @@
           <a:p>
             <a:fld id="{D651246A-AA0D-1344-AACC-8A747329776B}" type="datetimeFigureOut">
               <a:rPr lang="en-US" smtClean="0"/>
-              <a:t>7/7/21</a:t>
+              <a:t>9/9/21</a:t>
             </a:fld>
             <a:endParaRPr lang="en-US"/>
           </a:p>
@@ -1067,7 +1068,7 @@
           <a:p>
             <a:fld id="{D651246A-AA0D-1344-AACC-8A747329776B}" type="datetimeFigureOut">
               <a:rPr lang="en-US" smtClean="0"/>
-              <a:t>7/7/21</a:t>
+              <a:t>9/9/21</a:t>
             </a:fld>
             <a:endParaRPr lang="en-US"/>
           </a:p>
@@ -1267,7 +1268,7 @@
           <a:p>
             <a:fld id="{D651246A-AA0D-1344-AACC-8A747329776B}" type="datetimeFigureOut">
               <a:rPr lang="en-US" smtClean="0"/>
-              <a:t>7/7/21</a:t>
+              <a:t>9/9/21</a:t>
             </a:fld>
             <a:endParaRPr lang="en-US"/>
           </a:p>
@@ -1543,7 +1544,7 @@
           <a:p>
             <a:fld id="{D651246A-AA0D-1344-AACC-8A747329776B}" type="datetimeFigureOut">
               <a:rPr lang="en-US" smtClean="0"/>
-              <a:t>7/7/21</a:t>
+              <a:t>9/9/21</a:t>
             </a:fld>
             <a:endParaRPr lang="en-US"/>
           </a:p>
@@ -1811,7 +1812,7 @@
           <a:p>
             <a:fld id="{D651246A-AA0D-1344-AACC-8A747329776B}" type="datetimeFigureOut">
               <a:rPr lang="en-US" smtClean="0"/>
-              <a:t>7/7/21</a:t>
+              <a:t>9/9/21</a:t>
             </a:fld>
             <a:endParaRPr lang="en-US"/>
           </a:p>
@@ -2226,7 +2227,7 @@
           <a:p>
             <a:fld id="{D651246A-AA0D-1344-AACC-8A747329776B}" type="datetimeFigureOut">
               <a:rPr lang="en-US" smtClean="0"/>
-              <a:t>7/7/21</a:t>
+              <a:t>9/9/21</a:t>
             </a:fld>
             <a:endParaRPr lang="en-US"/>
           </a:p>
@@ -2368,7 +2369,7 @@
           <a:p>
             <a:fld id="{D651246A-AA0D-1344-AACC-8A747329776B}" type="datetimeFigureOut">
               <a:rPr lang="en-US" smtClean="0"/>
-              <a:t>7/7/21</a:t>
+              <a:t>9/9/21</a:t>
             </a:fld>
             <a:endParaRPr lang="en-US"/>
           </a:p>
@@ -2481,7 +2482,7 @@
           <a:p>
             <a:fld id="{D651246A-AA0D-1344-AACC-8A747329776B}" type="datetimeFigureOut">
               <a:rPr lang="en-US" smtClean="0"/>
-              <a:t>7/7/21</a:t>
+              <a:t>9/9/21</a:t>
             </a:fld>
             <a:endParaRPr lang="en-US"/>
           </a:p>
@@ -2794,7 +2795,7 @@
           <a:p>
             <a:fld id="{D651246A-AA0D-1344-AACC-8A747329776B}" type="datetimeFigureOut">
               <a:rPr lang="en-US" smtClean="0"/>
-              <a:t>7/7/21</a:t>
+              <a:t>9/9/21</a:t>
             </a:fld>
             <a:endParaRPr lang="en-US"/>
           </a:p>
@@ -3083,7 +3084,7 @@
           <a:p>
             <a:fld id="{D651246A-AA0D-1344-AACC-8A747329776B}" type="datetimeFigureOut">
               <a:rPr lang="en-US" smtClean="0"/>
-              <a:t>7/7/21</a:t>
+              <a:t>9/9/21</a:t>
             </a:fld>
             <a:endParaRPr lang="en-US"/>
           </a:p>
@@ -3326,7 +3327,7 @@
           <a:p>
             <a:fld id="{D651246A-AA0D-1344-AACC-8A747329776B}" type="datetimeFigureOut">
               <a:rPr lang="en-US" smtClean="0"/>
-              <a:t>7/7/21</a:t>
+              <a:t>9/9/21</a:t>
             </a:fld>
             <a:endParaRPr lang="en-US"/>
           </a:p>
@@ -3787,6 +3788,2382 @@
 </file>
 
 <file path=ppt/slides/slide10.xml><?xml version="1.0" encoding="utf-8"?>
+<p:sld xmlns:a="http://schemas.openxmlformats.org/drawingml/2006/main" xmlns:r="http://schemas.openxmlformats.org/officeDocument/2006/relationships" xmlns:p="http://schemas.openxmlformats.org/presentationml/2006/main">
+  <p:cSld>
+    <p:spTree>
+      <p:nvGrpSpPr>
+        <p:cNvPr id="1" name=""/>
+        <p:cNvGrpSpPr/>
+        <p:nvPr/>
+      </p:nvGrpSpPr>
+      <p:grpSpPr>
+        <a:xfrm>
+          <a:off x="0" y="0"/>
+          <a:ext cx="0" cy="0"/>
+          <a:chOff x="0" y="0"/>
+          <a:chExt cx="0" cy="0"/>
+        </a:xfrm>
+      </p:grpSpPr>
+      <p:sp>
+        <p:nvSpPr>
+          <p:cNvPr id="4" name="TextBox 3">
+            <a:extLst>
+              <a:ext uri="{FF2B5EF4-FFF2-40B4-BE49-F238E27FC236}">
+                <a16:creationId xmlns:a16="http://schemas.microsoft.com/office/drawing/2014/main" id="{C0976CFA-F460-D04F-AF4D-02350C22FADF}"/>
+              </a:ext>
+            </a:extLst>
+          </p:cNvPr>
+          <p:cNvSpPr txBox="1"/>
+          <p:nvPr/>
+        </p:nvSpPr>
+        <p:spPr>
+          <a:xfrm>
+            <a:off x="10443652" y="6386877"/>
+            <a:ext cx="1576714" cy="369332"/>
+          </a:xfrm>
+          <a:prstGeom prst="rect">
+            <a:avLst/>
+          </a:prstGeom>
+          <a:noFill/>
+          <a:ln w="47625">
+            <a:solidFill>
+              <a:schemeClr val="tx1"/>
+            </a:solidFill>
+          </a:ln>
+        </p:spPr>
+        <p:txBody>
+          <a:bodyPr wrap="square" rtlCol="0">
+            <a:spAutoFit/>
+          </a:bodyPr>
+          <a:lstStyle/>
+          <a:p>
+            <a:r>
+              <a:rPr lang="en-US" dirty="0"/>
+              <a:t>INC</a:t>
+            </a:r>
+          </a:p>
+        </p:txBody>
+      </p:sp>
+      <p:grpSp>
+        <p:nvGrpSpPr>
+          <p:cNvPr id="20" name="Group 19">
+            <a:extLst>
+              <a:ext uri="{FF2B5EF4-FFF2-40B4-BE49-F238E27FC236}">
+                <a16:creationId xmlns:a16="http://schemas.microsoft.com/office/drawing/2014/main" id="{6AF9AC7C-7B56-3D41-ADD2-030694E93EAD}"/>
+              </a:ext>
+            </a:extLst>
+          </p:cNvPr>
+          <p:cNvGrpSpPr/>
+          <p:nvPr/>
+        </p:nvGrpSpPr>
+        <p:grpSpPr>
+          <a:xfrm>
+            <a:off x="7904101" y="-118702"/>
+            <a:ext cx="4116265" cy="6434552"/>
+            <a:chOff x="7904101" y="-118702"/>
+            <a:chExt cx="4116265" cy="6434552"/>
+          </a:xfrm>
+        </p:grpSpPr>
+        <p:sp>
+          <p:nvSpPr>
+            <p:cNvPr id="6" name="Right Arrow 5">
+              <a:extLst>
+                <a:ext uri="{FF2B5EF4-FFF2-40B4-BE49-F238E27FC236}">
+                  <a16:creationId xmlns:a16="http://schemas.microsoft.com/office/drawing/2014/main" id="{1B52BBFC-9CA7-F24F-A635-B80E4B87060D}"/>
+                </a:ext>
+              </a:extLst>
+            </p:cNvPr>
+            <p:cNvSpPr/>
+            <p:nvPr/>
+          </p:nvSpPr>
+          <p:spPr>
+            <a:xfrm rot="16200000">
+              <a:off x="9942545" y="1576559"/>
+              <a:ext cx="306893" cy="129746"/>
+            </a:xfrm>
+            <a:prstGeom prst="rightArrow">
+              <a:avLst/>
+            </a:prstGeom>
+          </p:spPr>
+          <p:style>
+            <a:lnRef idx="0">
+              <a:schemeClr val="accent6"/>
+            </a:lnRef>
+            <a:fillRef idx="3">
+              <a:schemeClr val="accent6"/>
+            </a:fillRef>
+            <a:effectRef idx="3">
+              <a:schemeClr val="accent6"/>
+            </a:effectRef>
+            <a:fontRef idx="minor">
+              <a:schemeClr val="lt1"/>
+            </a:fontRef>
+          </p:style>
+          <p:txBody>
+            <a:bodyPr rtlCol="0" anchor="ctr">
+              <a:scene3d>
+                <a:camera prst="orthographicFront"/>
+                <a:lightRig rig="soft" dir="t">
+                  <a:rot lat="0" lon="0" rev="15600000"/>
+                </a:lightRig>
+              </a:scene3d>
+              <a:sp3d extrusionH="57150" prstMaterial="softEdge">
+                <a:bevelT w="25400" h="38100"/>
+              </a:sp3d>
+            </a:bodyPr>
+            <a:lstStyle/>
+            <a:p>
+              <a:pPr algn="ctr"/>
+              <a:endParaRPr lang="en-US" b="1">
+                <a:ln/>
+                <a:solidFill>
+                  <a:schemeClr val="accent4"/>
+                </a:solidFill>
+              </a:endParaRPr>
+            </a:p>
+          </p:txBody>
+        </p:sp>
+        <p:sp>
+          <p:nvSpPr>
+            <p:cNvPr id="7" name="TextBox 6">
+              <a:extLst>
+                <a:ext uri="{FF2B5EF4-FFF2-40B4-BE49-F238E27FC236}">
+                  <a16:creationId xmlns:a16="http://schemas.microsoft.com/office/drawing/2014/main" id="{B5B7DC3A-9EAF-244D-875C-FAE04D367D4F}"/>
+                </a:ext>
+              </a:extLst>
+            </p:cNvPr>
+            <p:cNvSpPr txBox="1"/>
+            <p:nvPr/>
+          </p:nvSpPr>
+          <p:spPr>
+            <a:xfrm>
+              <a:off x="9150798" y="1791535"/>
+              <a:ext cx="2869568" cy="4524315"/>
+            </a:xfrm>
+            <a:prstGeom prst="rect">
+              <a:avLst/>
+            </a:prstGeom>
+            <a:noFill/>
+          </p:spPr>
+          <p:txBody>
+            <a:bodyPr wrap="square" rtlCol="0">
+              <a:spAutoFit/>
+            </a:bodyPr>
+            <a:lstStyle/>
+            <a:p>
+              <a:r>
+                <a:rPr lang="en-US" dirty="0"/>
+                <a:t>0000 for Register 0</a:t>
+              </a:r>
+            </a:p>
+            <a:p>
+              <a:r>
+                <a:rPr lang="en-US" dirty="0"/>
+                <a:t>0001 for Register 1 </a:t>
+              </a:r>
+            </a:p>
+            <a:p>
+              <a:r>
+                <a:rPr lang="en-US" dirty="0"/>
+                <a:t>0010 for Register 2</a:t>
+              </a:r>
+            </a:p>
+            <a:p>
+              <a:r>
+                <a:rPr lang="en-US" dirty="0"/>
+                <a:t>0011 for Register 3</a:t>
+              </a:r>
+            </a:p>
+            <a:p>
+              <a:r>
+                <a:rPr lang="en-US" dirty="0"/>
+                <a:t>0100 for Register 4</a:t>
+              </a:r>
+            </a:p>
+            <a:p>
+              <a:r>
+                <a:rPr lang="en-US" dirty="0"/>
+                <a:t>0101 for Register 5</a:t>
+              </a:r>
+            </a:p>
+            <a:p>
+              <a:r>
+                <a:rPr lang="en-US" dirty="0"/>
+                <a:t>0110 for Register 6</a:t>
+              </a:r>
+            </a:p>
+            <a:p>
+              <a:r>
+                <a:rPr lang="en-US" dirty="0"/>
+                <a:t>0111 for Register 7</a:t>
+              </a:r>
+            </a:p>
+            <a:p>
+              <a:r>
+                <a:rPr lang="en-US" dirty="0"/>
+                <a:t>1000 for Register 8</a:t>
+              </a:r>
+            </a:p>
+            <a:p>
+              <a:r>
+                <a:rPr lang="en-US" dirty="0"/>
+                <a:t>1001 for Register 9</a:t>
+              </a:r>
+            </a:p>
+            <a:p>
+              <a:r>
+                <a:rPr lang="en-US" dirty="0"/>
+                <a:t>1010 for Register 10</a:t>
+              </a:r>
+            </a:p>
+            <a:p>
+              <a:r>
+                <a:rPr lang="en-US" dirty="0"/>
+                <a:t>1011 for Register 11</a:t>
+              </a:r>
+            </a:p>
+            <a:p>
+              <a:r>
+                <a:rPr lang="en-US" dirty="0"/>
+                <a:t>1100 for Register 12</a:t>
+              </a:r>
+            </a:p>
+            <a:p>
+              <a:r>
+                <a:rPr lang="en-US" dirty="0"/>
+                <a:t>1101 for Register 13</a:t>
+              </a:r>
+            </a:p>
+            <a:p>
+              <a:r>
+                <a:rPr lang="en-US" dirty="0"/>
+                <a:t>1110 for Register 14</a:t>
+              </a:r>
+            </a:p>
+            <a:p>
+              <a:r>
+                <a:rPr lang="en-US" dirty="0"/>
+                <a:t>1111 for Register 15</a:t>
+              </a:r>
+            </a:p>
+          </p:txBody>
+        </p:sp>
+        <p:sp>
+          <p:nvSpPr>
+            <p:cNvPr id="8" name="TextBox 7">
+              <a:extLst>
+                <a:ext uri="{FF2B5EF4-FFF2-40B4-BE49-F238E27FC236}">
+                  <a16:creationId xmlns:a16="http://schemas.microsoft.com/office/drawing/2014/main" id="{F74DCC78-A8E0-9746-A0C2-ABD2C1686796}"/>
+                </a:ext>
+              </a:extLst>
+            </p:cNvPr>
+            <p:cNvSpPr txBox="1"/>
+            <p:nvPr/>
+          </p:nvSpPr>
+          <p:spPr>
+            <a:xfrm>
+              <a:off x="7908026" y="517024"/>
+              <a:ext cx="3153427" cy="540000"/>
+            </a:xfrm>
+            <a:prstGeom prst="rect">
+              <a:avLst/>
+            </a:prstGeom>
+            <a:noFill/>
+            <a:ln w="47625">
+              <a:solidFill>
+                <a:schemeClr val="tx1"/>
+              </a:solidFill>
+            </a:ln>
+          </p:spPr>
+          <p:txBody>
+            <a:bodyPr wrap="square" rtlCol="0">
+              <a:spAutoFit/>
+            </a:bodyPr>
+            <a:lstStyle/>
+            <a:p>
+              <a:endParaRPr lang="en-US" dirty="0"/>
+            </a:p>
+          </p:txBody>
+        </p:sp>
+        <p:sp>
+          <p:nvSpPr>
+            <p:cNvPr id="9" name="TextBox 8">
+              <a:extLst>
+                <a:ext uri="{FF2B5EF4-FFF2-40B4-BE49-F238E27FC236}">
+                  <a16:creationId xmlns:a16="http://schemas.microsoft.com/office/drawing/2014/main" id="{034640F2-2F60-5449-A9F2-C598AFF40BBF}"/>
+                </a:ext>
+              </a:extLst>
+            </p:cNvPr>
+            <p:cNvSpPr txBox="1"/>
+            <p:nvPr/>
+          </p:nvSpPr>
+          <p:spPr>
+            <a:xfrm>
+              <a:off x="7908026" y="517024"/>
+              <a:ext cx="1576714" cy="540000"/>
+            </a:xfrm>
+            <a:prstGeom prst="rect">
+              <a:avLst/>
+            </a:prstGeom>
+            <a:noFill/>
+            <a:ln w="47625">
+              <a:solidFill>
+                <a:schemeClr val="tx1"/>
+              </a:solidFill>
+            </a:ln>
+          </p:spPr>
+          <p:txBody>
+            <a:bodyPr wrap="square" rtlCol="0">
+              <a:spAutoFit/>
+            </a:bodyPr>
+            <a:lstStyle/>
+            <a:p>
+              <a:endParaRPr lang="en-US" dirty="0"/>
+            </a:p>
+          </p:txBody>
+        </p:sp>
+        <p:sp>
+          <p:nvSpPr>
+            <p:cNvPr id="10" name="TextBox 9">
+              <a:extLst>
+                <a:ext uri="{FF2B5EF4-FFF2-40B4-BE49-F238E27FC236}">
+                  <a16:creationId xmlns:a16="http://schemas.microsoft.com/office/drawing/2014/main" id="{B2147DF6-AD7E-1A48-9343-CCFE9BD207F6}"/>
+                </a:ext>
+              </a:extLst>
+            </p:cNvPr>
+            <p:cNvSpPr txBox="1"/>
+            <p:nvPr/>
+          </p:nvSpPr>
+          <p:spPr>
+            <a:xfrm>
+              <a:off x="7908026" y="517024"/>
+              <a:ext cx="788357" cy="540000"/>
+            </a:xfrm>
+            <a:prstGeom prst="rect">
+              <a:avLst/>
+            </a:prstGeom>
+            <a:noFill/>
+            <a:ln w="47625">
+              <a:solidFill>
+                <a:schemeClr val="tx1"/>
+              </a:solidFill>
+            </a:ln>
+          </p:spPr>
+          <p:txBody>
+            <a:bodyPr wrap="square" rtlCol="0">
+              <a:spAutoFit/>
+            </a:bodyPr>
+            <a:lstStyle/>
+            <a:p>
+              <a:endParaRPr lang="en-US" dirty="0"/>
+            </a:p>
+          </p:txBody>
+        </p:sp>
+        <p:sp>
+          <p:nvSpPr>
+            <p:cNvPr id="11" name="TextBox 10">
+              <a:extLst>
+                <a:ext uri="{FF2B5EF4-FFF2-40B4-BE49-F238E27FC236}">
+                  <a16:creationId xmlns:a16="http://schemas.microsoft.com/office/drawing/2014/main" id="{E150D5ED-454A-A743-B928-140372ED3B9A}"/>
+                </a:ext>
+              </a:extLst>
+            </p:cNvPr>
+            <p:cNvSpPr txBox="1"/>
+            <p:nvPr/>
+          </p:nvSpPr>
+          <p:spPr>
+            <a:xfrm>
+              <a:off x="9484740" y="517024"/>
+              <a:ext cx="788357" cy="540000"/>
+            </a:xfrm>
+            <a:prstGeom prst="rect">
+              <a:avLst/>
+            </a:prstGeom>
+            <a:noFill/>
+            <a:ln w="47625">
+              <a:solidFill>
+                <a:schemeClr val="tx1"/>
+              </a:solidFill>
+            </a:ln>
+          </p:spPr>
+          <p:txBody>
+            <a:bodyPr wrap="square" rtlCol="0">
+              <a:spAutoFit/>
+            </a:bodyPr>
+            <a:lstStyle/>
+            <a:p>
+              <a:endParaRPr lang="en-US" dirty="0"/>
+            </a:p>
+          </p:txBody>
+        </p:sp>
+        <p:sp>
+          <p:nvSpPr>
+            <p:cNvPr id="12" name="TextBox 11">
+              <a:extLst>
+                <a:ext uri="{FF2B5EF4-FFF2-40B4-BE49-F238E27FC236}">
+                  <a16:creationId xmlns:a16="http://schemas.microsoft.com/office/drawing/2014/main" id="{D8E51B1F-DF1D-2A40-A8FD-869BF68A0B57}"/>
+                </a:ext>
+              </a:extLst>
+            </p:cNvPr>
+            <p:cNvSpPr txBox="1"/>
+            <p:nvPr/>
+          </p:nvSpPr>
+          <p:spPr>
+            <a:xfrm>
+              <a:off x="7908026" y="517024"/>
+              <a:ext cx="394178" cy="540000"/>
+            </a:xfrm>
+            <a:prstGeom prst="rect">
+              <a:avLst/>
+            </a:prstGeom>
+            <a:noFill/>
+            <a:ln w="47625">
+              <a:solidFill>
+                <a:schemeClr val="tx1"/>
+              </a:solidFill>
+            </a:ln>
+          </p:spPr>
+          <p:txBody>
+            <a:bodyPr wrap="square" rtlCol="0">
+              <a:spAutoFit/>
+            </a:bodyPr>
+            <a:lstStyle/>
+            <a:p>
+              <a:endParaRPr lang="en-US" dirty="0"/>
+            </a:p>
+          </p:txBody>
+        </p:sp>
+        <p:sp>
+          <p:nvSpPr>
+            <p:cNvPr id="13" name="TextBox 12">
+              <a:extLst>
+                <a:ext uri="{FF2B5EF4-FFF2-40B4-BE49-F238E27FC236}">
+                  <a16:creationId xmlns:a16="http://schemas.microsoft.com/office/drawing/2014/main" id="{06FE54DD-6A9E-244A-ADEA-A33CBB35AFB5}"/>
+                </a:ext>
+              </a:extLst>
+            </p:cNvPr>
+            <p:cNvSpPr txBox="1"/>
+            <p:nvPr/>
+          </p:nvSpPr>
+          <p:spPr>
+            <a:xfrm>
+              <a:off x="9090561" y="517024"/>
+              <a:ext cx="788357" cy="540000"/>
+            </a:xfrm>
+            <a:prstGeom prst="rect">
+              <a:avLst/>
+            </a:prstGeom>
+            <a:noFill/>
+            <a:ln w="47625">
+              <a:solidFill>
+                <a:schemeClr val="tx1"/>
+              </a:solidFill>
+            </a:ln>
+          </p:spPr>
+          <p:txBody>
+            <a:bodyPr wrap="square" rtlCol="0">
+              <a:spAutoFit/>
+            </a:bodyPr>
+            <a:lstStyle/>
+            <a:p>
+              <a:endParaRPr lang="en-US" dirty="0"/>
+            </a:p>
+          </p:txBody>
+        </p:sp>
+        <p:sp>
+          <p:nvSpPr>
+            <p:cNvPr id="14" name="TextBox 13">
+              <a:extLst>
+                <a:ext uri="{FF2B5EF4-FFF2-40B4-BE49-F238E27FC236}">
+                  <a16:creationId xmlns:a16="http://schemas.microsoft.com/office/drawing/2014/main" id="{2BC0252B-0E85-9B4C-A08F-B4D2B799E0B5}"/>
+                </a:ext>
+              </a:extLst>
+            </p:cNvPr>
+            <p:cNvSpPr txBox="1"/>
+            <p:nvPr/>
+          </p:nvSpPr>
+          <p:spPr>
+            <a:xfrm>
+              <a:off x="9878918" y="517024"/>
+              <a:ext cx="788357" cy="540000"/>
+            </a:xfrm>
+            <a:prstGeom prst="rect">
+              <a:avLst/>
+            </a:prstGeom>
+            <a:noFill/>
+            <a:ln w="47625">
+              <a:solidFill>
+                <a:schemeClr val="tx1"/>
+              </a:solidFill>
+            </a:ln>
+          </p:spPr>
+          <p:txBody>
+            <a:bodyPr wrap="square" rtlCol="0">
+              <a:spAutoFit/>
+            </a:bodyPr>
+            <a:lstStyle/>
+            <a:p>
+              <a:endParaRPr lang="en-US" dirty="0"/>
+            </a:p>
+          </p:txBody>
+        </p:sp>
+        <p:sp>
+          <p:nvSpPr>
+            <p:cNvPr id="15" name="TextBox 14">
+              <a:extLst>
+                <a:ext uri="{FF2B5EF4-FFF2-40B4-BE49-F238E27FC236}">
+                  <a16:creationId xmlns:a16="http://schemas.microsoft.com/office/drawing/2014/main" id="{DD44DAA3-5164-3E42-8B19-F33C1CB98073}"/>
+                </a:ext>
+              </a:extLst>
+            </p:cNvPr>
+            <p:cNvSpPr txBox="1"/>
+            <p:nvPr/>
+          </p:nvSpPr>
+          <p:spPr>
+            <a:xfrm>
+              <a:off x="7904101" y="494636"/>
+              <a:ext cx="3324999" cy="584775"/>
+            </a:xfrm>
+            <a:prstGeom prst="rect">
+              <a:avLst/>
+            </a:prstGeom>
+            <a:noFill/>
+          </p:spPr>
+          <p:txBody>
+            <a:bodyPr wrap="square" rtlCol="0">
+              <a:spAutoFit/>
+            </a:bodyPr>
+            <a:lstStyle/>
+            <a:p>
+              <a:r>
+                <a:rPr lang="en-US" sz="3200" dirty="0"/>
+                <a:t>0  1  1  0  R</a:t>
+              </a:r>
+              <a:r>
+                <a:rPr lang="en-US" sz="2000" baseline="-25000" dirty="0"/>
+                <a:t> </a:t>
+              </a:r>
+              <a:r>
+                <a:rPr lang="en-US" sz="3200" dirty="0"/>
+                <a:t>  R</a:t>
+              </a:r>
+              <a:r>
+                <a:rPr lang="en-US" sz="3200" baseline="-25000" dirty="0"/>
+                <a:t> </a:t>
+              </a:r>
+              <a:r>
+                <a:rPr lang="en-US" sz="3200" dirty="0"/>
+                <a:t> R</a:t>
+              </a:r>
+              <a:r>
+                <a:rPr lang="en-US" sz="3200" baseline="-25000" dirty="0"/>
+                <a:t> </a:t>
+              </a:r>
+              <a:r>
+                <a:rPr lang="en-US" sz="3200" dirty="0"/>
+                <a:t> R</a:t>
+              </a:r>
+              <a:endParaRPr lang="en-US" sz="3200" baseline="-25000" dirty="0"/>
+            </a:p>
+          </p:txBody>
+        </p:sp>
+        <p:sp>
+          <p:nvSpPr>
+            <p:cNvPr id="16" name="Double Brace 15">
+              <a:extLst>
+                <a:ext uri="{FF2B5EF4-FFF2-40B4-BE49-F238E27FC236}">
+                  <a16:creationId xmlns:a16="http://schemas.microsoft.com/office/drawing/2014/main" id="{FD19FD86-D692-674D-913A-4E440CE76C6F}"/>
+                </a:ext>
+              </a:extLst>
+            </p:cNvPr>
+            <p:cNvSpPr/>
+            <p:nvPr/>
+          </p:nvSpPr>
+          <p:spPr>
+            <a:xfrm rot="16200000">
+              <a:off x="9409201" y="95043"/>
+              <a:ext cx="1373582" cy="1179197"/>
+            </a:xfrm>
+            <a:prstGeom prst="bracePair">
+              <a:avLst/>
+            </a:prstGeom>
+            <a:ln w="38100">
+              <a:solidFill>
+                <a:schemeClr val="tx1">
+                  <a:lumMod val="95000"/>
+                  <a:lumOff val="5000"/>
+                </a:schemeClr>
+              </a:solidFill>
+            </a:ln>
+          </p:spPr>
+          <p:style>
+            <a:lnRef idx="1">
+              <a:schemeClr val="accent1"/>
+            </a:lnRef>
+            <a:fillRef idx="0">
+              <a:schemeClr val="accent1"/>
+            </a:fillRef>
+            <a:effectRef idx="0">
+              <a:schemeClr val="accent1"/>
+            </a:effectRef>
+            <a:fontRef idx="minor">
+              <a:schemeClr val="tx1"/>
+            </a:fontRef>
+          </p:style>
+          <p:txBody>
+            <a:bodyPr rtlCol="0" anchor="ctr"/>
+            <a:lstStyle/>
+            <a:p>
+              <a:pPr algn="ctr"/>
+              <a:endParaRPr lang="en-US"/>
+            </a:p>
+          </p:txBody>
+        </p:sp>
+        <p:sp>
+          <p:nvSpPr>
+            <p:cNvPr id="17" name="TextBox 16">
+              <a:extLst>
+                <a:ext uri="{FF2B5EF4-FFF2-40B4-BE49-F238E27FC236}">
+                  <a16:creationId xmlns:a16="http://schemas.microsoft.com/office/drawing/2014/main" id="{C8F000F5-8A67-9E43-B378-EA0539E126BF}"/>
+                </a:ext>
+              </a:extLst>
+            </p:cNvPr>
+            <p:cNvSpPr txBox="1"/>
+            <p:nvPr/>
+          </p:nvSpPr>
+          <p:spPr>
+            <a:xfrm>
+              <a:off x="9090561" y="-118702"/>
+              <a:ext cx="1946823" cy="540000"/>
+            </a:xfrm>
+            <a:prstGeom prst="rect">
+              <a:avLst/>
+            </a:prstGeom>
+            <a:solidFill>
+              <a:schemeClr val="bg1"/>
+            </a:solidFill>
+            <a:ln w="47625">
+              <a:noFill/>
+            </a:ln>
+          </p:spPr>
+          <p:txBody>
+            <a:bodyPr wrap="square" rtlCol="0">
+              <a:spAutoFit/>
+            </a:bodyPr>
+            <a:lstStyle/>
+            <a:p>
+              <a:endParaRPr lang="en-US" dirty="0"/>
+            </a:p>
+          </p:txBody>
+        </p:sp>
+      </p:grpSp>
+      <p:cxnSp>
+        <p:nvCxnSpPr>
+          <p:cNvPr id="26" name="Straight Connector 25">
+            <a:extLst>
+              <a:ext uri="{FF2B5EF4-FFF2-40B4-BE49-F238E27FC236}">
+                <a16:creationId xmlns:a16="http://schemas.microsoft.com/office/drawing/2014/main" id="{B037EF98-B4D9-6F43-9D34-ECA22F8E3D2E}"/>
+              </a:ext>
+            </a:extLst>
+          </p:cNvPr>
+          <p:cNvCxnSpPr>
+            <a:cxnSpLocks/>
+          </p:cNvCxnSpPr>
+          <p:nvPr/>
+        </p:nvCxnSpPr>
+        <p:spPr>
+          <a:xfrm>
+            <a:off x="7335982" y="-156754"/>
+            <a:ext cx="0" cy="7053943"/>
+          </a:xfrm>
+          <a:prstGeom prst="line">
+            <a:avLst/>
+          </a:prstGeom>
+          <a:ln w="63500">
+            <a:solidFill>
+              <a:schemeClr val="tx1"/>
+            </a:solidFill>
+          </a:ln>
+        </p:spPr>
+        <p:style>
+          <a:lnRef idx="1">
+            <a:schemeClr val="accent1"/>
+          </a:lnRef>
+          <a:fillRef idx="0">
+            <a:schemeClr val="accent1"/>
+          </a:fillRef>
+          <a:effectRef idx="0">
+            <a:schemeClr val="accent1"/>
+          </a:effectRef>
+          <a:fontRef idx="minor">
+            <a:schemeClr val="tx1"/>
+          </a:fontRef>
+        </p:style>
+      </p:cxnSp>
+      <p:sp>
+        <p:nvSpPr>
+          <p:cNvPr id="22" name="TextBox 21">
+            <a:extLst>
+              <a:ext uri="{FF2B5EF4-FFF2-40B4-BE49-F238E27FC236}">
+                <a16:creationId xmlns:a16="http://schemas.microsoft.com/office/drawing/2014/main" id="{12A78311-214F-074C-BF2B-8A167B49EB6D}"/>
+              </a:ext>
+            </a:extLst>
+          </p:cNvPr>
+          <p:cNvSpPr txBox="1"/>
+          <p:nvPr/>
+        </p:nvSpPr>
+        <p:spPr>
+          <a:xfrm>
+            <a:off x="5276041" y="6386877"/>
+            <a:ext cx="1576714" cy="369332"/>
+          </a:xfrm>
+          <a:prstGeom prst="rect">
+            <a:avLst/>
+          </a:prstGeom>
+          <a:noFill/>
+          <a:ln w="47625">
+            <a:solidFill>
+              <a:schemeClr val="tx1"/>
+            </a:solidFill>
+          </a:ln>
+        </p:spPr>
+        <p:txBody>
+          <a:bodyPr wrap="square" rtlCol="0">
+            <a:spAutoFit/>
+          </a:bodyPr>
+          <a:lstStyle/>
+          <a:p>
+            <a:endParaRPr lang="en-US" dirty="0"/>
+          </a:p>
+        </p:txBody>
+      </p:sp>
+      <p:grpSp>
+        <p:nvGrpSpPr>
+          <p:cNvPr id="35" name="Group 34">
+            <a:extLst>
+              <a:ext uri="{FF2B5EF4-FFF2-40B4-BE49-F238E27FC236}">
+                <a16:creationId xmlns:a16="http://schemas.microsoft.com/office/drawing/2014/main" id="{ECC5D612-B5F5-1A44-AF07-871CD1862A95}"/>
+              </a:ext>
+            </a:extLst>
+          </p:cNvPr>
+          <p:cNvGrpSpPr/>
+          <p:nvPr/>
+        </p:nvGrpSpPr>
+        <p:grpSpPr>
+          <a:xfrm>
+            <a:off x="1712460" y="0"/>
+            <a:ext cx="5140296" cy="2448804"/>
+            <a:chOff x="2978604" y="509314"/>
+            <a:chExt cx="5140296" cy="2448804"/>
+          </a:xfrm>
+        </p:grpSpPr>
+        <p:sp>
+          <p:nvSpPr>
+            <p:cNvPr id="36" name="Double Brace 35">
+              <a:extLst>
+                <a:ext uri="{FF2B5EF4-FFF2-40B4-BE49-F238E27FC236}">
+                  <a16:creationId xmlns:a16="http://schemas.microsoft.com/office/drawing/2014/main" id="{94F8AD14-33B4-5F48-AC07-DD5ED99FB800}"/>
+                </a:ext>
+              </a:extLst>
+            </p:cNvPr>
+            <p:cNvSpPr/>
+            <p:nvPr/>
+          </p:nvSpPr>
+          <p:spPr>
+            <a:xfrm rot="16200000">
+              <a:off x="5747317" y="-125799"/>
+              <a:ext cx="1373582" cy="3183811"/>
+            </a:xfrm>
+            <a:prstGeom prst="bracePair">
+              <a:avLst/>
+            </a:prstGeom>
+            <a:ln w="38100">
+              <a:solidFill>
+                <a:schemeClr val="tx1">
+                  <a:lumMod val="95000"/>
+                  <a:lumOff val="5000"/>
+                </a:schemeClr>
+              </a:solidFill>
+            </a:ln>
+          </p:spPr>
+          <p:style>
+            <a:lnRef idx="1">
+              <a:schemeClr val="accent1"/>
+            </a:lnRef>
+            <a:fillRef idx="0">
+              <a:schemeClr val="accent1"/>
+            </a:fillRef>
+            <a:effectRef idx="0">
+              <a:schemeClr val="accent1"/>
+            </a:effectRef>
+            <a:fontRef idx="minor">
+              <a:schemeClr val="tx1"/>
+            </a:fontRef>
+          </p:style>
+          <p:txBody>
+            <a:bodyPr rtlCol="0" anchor="ctr"/>
+            <a:lstStyle/>
+            <a:p>
+              <a:pPr algn="ctr"/>
+              <a:endParaRPr lang="en-US"/>
+            </a:p>
+          </p:txBody>
+        </p:sp>
+        <p:grpSp>
+          <p:nvGrpSpPr>
+            <p:cNvPr id="37" name="Group 36">
+              <a:extLst>
+                <a:ext uri="{FF2B5EF4-FFF2-40B4-BE49-F238E27FC236}">
+                  <a16:creationId xmlns:a16="http://schemas.microsoft.com/office/drawing/2014/main" id="{49F1B100-FED0-5B4D-AC8D-C91F4E52F777}"/>
+                </a:ext>
+              </a:extLst>
+            </p:cNvPr>
+            <p:cNvGrpSpPr/>
+            <p:nvPr/>
+          </p:nvGrpSpPr>
+          <p:grpSpPr>
+            <a:xfrm>
+              <a:off x="2978604" y="509314"/>
+              <a:ext cx="5140296" cy="1329174"/>
+              <a:chOff x="2978604" y="509314"/>
+              <a:chExt cx="5140296" cy="1329174"/>
+            </a:xfrm>
+          </p:grpSpPr>
+          <p:grpSp>
+            <p:nvGrpSpPr>
+              <p:cNvPr id="42" name="Group 41">
+                <a:extLst>
+                  <a:ext uri="{FF2B5EF4-FFF2-40B4-BE49-F238E27FC236}">
+                    <a16:creationId xmlns:a16="http://schemas.microsoft.com/office/drawing/2014/main" id="{ABA1BF4F-18CC-F84D-98EE-074A92F61A75}"/>
+                  </a:ext>
+                </a:extLst>
+              </p:cNvPr>
+              <p:cNvGrpSpPr/>
+              <p:nvPr/>
+            </p:nvGrpSpPr>
+            <p:grpSpPr>
+              <a:xfrm>
+                <a:off x="4842203" y="1298488"/>
+                <a:ext cx="3276697" cy="540000"/>
+                <a:chOff x="1573971" y="1298488"/>
+                <a:chExt cx="3276697" cy="540000"/>
+              </a:xfrm>
+            </p:grpSpPr>
+            <p:grpSp>
+              <p:nvGrpSpPr>
+                <p:cNvPr id="44" name="Group 43">
+                  <a:extLst>
+                    <a:ext uri="{FF2B5EF4-FFF2-40B4-BE49-F238E27FC236}">
+                      <a16:creationId xmlns:a16="http://schemas.microsoft.com/office/drawing/2014/main" id="{39FAFC79-CA42-F340-9B85-E6CCB46FBE4F}"/>
+                    </a:ext>
+                  </a:extLst>
+                </p:cNvPr>
+                <p:cNvGrpSpPr/>
+                <p:nvPr/>
+              </p:nvGrpSpPr>
+              <p:grpSpPr>
+                <a:xfrm>
+                  <a:off x="1604353" y="1298488"/>
+                  <a:ext cx="3153427" cy="540000"/>
+                  <a:chOff x="6267794" y="658408"/>
+                  <a:chExt cx="2880000" cy="540000"/>
+                </a:xfrm>
+              </p:grpSpPr>
+              <p:sp>
+                <p:nvSpPr>
+                  <p:cNvPr id="46" name="TextBox 45">
+                    <a:extLst>
+                      <a:ext uri="{FF2B5EF4-FFF2-40B4-BE49-F238E27FC236}">
+                        <a16:creationId xmlns:a16="http://schemas.microsoft.com/office/drawing/2014/main" id="{520BA237-C405-0C4C-A2D0-E1EFA90C0CE9}"/>
+                      </a:ext>
+                    </a:extLst>
+                  </p:cNvPr>
+                  <p:cNvSpPr txBox="1"/>
+                  <p:nvPr/>
+                </p:nvSpPr>
+                <p:spPr>
+                  <a:xfrm>
+                    <a:off x="6267794" y="658408"/>
+                    <a:ext cx="2880000" cy="540000"/>
+                  </a:xfrm>
+                  <a:prstGeom prst="rect">
+                    <a:avLst/>
+                  </a:prstGeom>
+                  <a:noFill/>
+                  <a:ln w="47625">
+                    <a:solidFill>
+                      <a:schemeClr val="tx1"/>
+                    </a:solidFill>
+                  </a:ln>
+                </p:spPr>
+                <p:txBody>
+                  <a:bodyPr wrap="square" rtlCol="0">
+                    <a:spAutoFit/>
+                  </a:bodyPr>
+                  <a:lstStyle/>
+                  <a:p>
+                    <a:endParaRPr lang="en-US" dirty="0"/>
+                  </a:p>
+                </p:txBody>
+              </p:sp>
+              <p:sp>
+                <p:nvSpPr>
+                  <p:cNvPr id="47" name="TextBox 46">
+                    <a:extLst>
+                      <a:ext uri="{FF2B5EF4-FFF2-40B4-BE49-F238E27FC236}">
+                        <a16:creationId xmlns:a16="http://schemas.microsoft.com/office/drawing/2014/main" id="{67B9E103-E3A5-E648-A388-F367A86EE59E}"/>
+                      </a:ext>
+                    </a:extLst>
+                  </p:cNvPr>
+                  <p:cNvSpPr txBox="1"/>
+                  <p:nvPr/>
+                </p:nvSpPr>
+                <p:spPr>
+                  <a:xfrm>
+                    <a:off x="6267794" y="658408"/>
+                    <a:ext cx="1440000" cy="540000"/>
+                  </a:xfrm>
+                  <a:prstGeom prst="rect">
+                    <a:avLst/>
+                  </a:prstGeom>
+                  <a:noFill/>
+                  <a:ln w="47625">
+                    <a:solidFill>
+                      <a:schemeClr val="tx1"/>
+                    </a:solidFill>
+                  </a:ln>
+                </p:spPr>
+                <p:txBody>
+                  <a:bodyPr wrap="square" rtlCol="0">
+                    <a:spAutoFit/>
+                  </a:bodyPr>
+                  <a:lstStyle/>
+                  <a:p>
+                    <a:endParaRPr lang="en-US" dirty="0"/>
+                  </a:p>
+                </p:txBody>
+              </p:sp>
+              <p:sp>
+                <p:nvSpPr>
+                  <p:cNvPr id="48" name="TextBox 47">
+                    <a:extLst>
+                      <a:ext uri="{FF2B5EF4-FFF2-40B4-BE49-F238E27FC236}">
+                        <a16:creationId xmlns:a16="http://schemas.microsoft.com/office/drawing/2014/main" id="{3172AC68-3F1C-9D44-9C49-D165B4B34E8F}"/>
+                      </a:ext>
+                    </a:extLst>
+                  </p:cNvPr>
+                  <p:cNvSpPr txBox="1"/>
+                  <p:nvPr/>
+                </p:nvSpPr>
+                <p:spPr>
+                  <a:xfrm>
+                    <a:off x="6267794" y="658408"/>
+                    <a:ext cx="720000" cy="540000"/>
+                  </a:xfrm>
+                  <a:prstGeom prst="rect">
+                    <a:avLst/>
+                  </a:prstGeom>
+                  <a:noFill/>
+                  <a:ln w="47625">
+                    <a:solidFill>
+                      <a:schemeClr val="tx1"/>
+                    </a:solidFill>
+                  </a:ln>
+                </p:spPr>
+                <p:txBody>
+                  <a:bodyPr wrap="square" rtlCol="0">
+                    <a:spAutoFit/>
+                  </a:bodyPr>
+                  <a:lstStyle/>
+                  <a:p>
+                    <a:endParaRPr lang="en-US" dirty="0"/>
+                  </a:p>
+                </p:txBody>
+              </p:sp>
+              <p:sp>
+                <p:nvSpPr>
+                  <p:cNvPr id="49" name="TextBox 48">
+                    <a:extLst>
+                      <a:ext uri="{FF2B5EF4-FFF2-40B4-BE49-F238E27FC236}">
+                        <a16:creationId xmlns:a16="http://schemas.microsoft.com/office/drawing/2014/main" id="{04DE0E80-151F-2943-B2BB-E985E6CEB933}"/>
+                      </a:ext>
+                    </a:extLst>
+                  </p:cNvPr>
+                  <p:cNvSpPr txBox="1"/>
+                  <p:nvPr/>
+                </p:nvSpPr>
+                <p:spPr>
+                  <a:xfrm>
+                    <a:off x="7707794" y="658408"/>
+                    <a:ext cx="720000" cy="540000"/>
+                  </a:xfrm>
+                  <a:prstGeom prst="rect">
+                    <a:avLst/>
+                  </a:prstGeom>
+                  <a:noFill/>
+                  <a:ln w="47625">
+                    <a:solidFill>
+                      <a:schemeClr val="tx1"/>
+                    </a:solidFill>
+                  </a:ln>
+                </p:spPr>
+                <p:txBody>
+                  <a:bodyPr wrap="square" rtlCol="0">
+                    <a:spAutoFit/>
+                  </a:bodyPr>
+                  <a:lstStyle/>
+                  <a:p>
+                    <a:endParaRPr lang="en-US" dirty="0"/>
+                  </a:p>
+                </p:txBody>
+              </p:sp>
+              <p:sp>
+                <p:nvSpPr>
+                  <p:cNvPr id="50" name="TextBox 49">
+                    <a:extLst>
+                      <a:ext uri="{FF2B5EF4-FFF2-40B4-BE49-F238E27FC236}">
+                        <a16:creationId xmlns:a16="http://schemas.microsoft.com/office/drawing/2014/main" id="{77F63049-8969-5B40-A553-8A44980A045A}"/>
+                      </a:ext>
+                    </a:extLst>
+                  </p:cNvPr>
+                  <p:cNvSpPr txBox="1"/>
+                  <p:nvPr/>
+                </p:nvSpPr>
+                <p:spPr>
+                  <a:xfrm>
+                    <a:off x="6267794" y="658408"/>
+                    <a:ext cx="360000" cy="540000"/>
+                  </a:xfrm>
+                  <a:prstGeom prst="rect">
+                    <a:avLst/>
+                  </a:prstGeom>
+                  <a:noFill/>
+                  <a:ln w="47625">
+                    <a:solidFill>
+                      <a:schemeClr val="tx1"/>
+                    </a:solidFill>
+                  </a:ln>
+                </p:spPr>
+                <p:txBody>
+                  <a:bodyPr wrap="square" rtlCol="0">
+                    <a:spAutoFit/>
+                  </a:bodyPr>
+                  <a:lstStyle/>
+                  <a:p>
+                    <a:endParaRPr lang="en-US" dirty="0"/>
+                  </a:p>
+                </p:txBody>
+              </p:sp>
+              <p:sp>
+                <p:nvSpPr>
+                  <p:cNvPr id="51" name="TextBox 50">
+                    <a:extLst>
+                      <a:ext uri="{FF2B5EF4-FFF2-40B4-BE49-F238E27FC236}">
+                        <a16:creationId xmlns:a16="http://schemas.microsoft.com/office/drawing/2014/main" id="{79BD86A8-EFC4-AF4C-B2B2-AB9970B0C453}"/>
+                      </a:ext>
+                    </a:extLst>
+                  </p:cNvPr>
+                  <p:cNvSpPr txBox="1"/>
+                  <p:nvPr/>
+                </p:nvSpPr>
+                <p:spPr>
+                  <a:xfrm>
+                    <a:off x="7347794" y="658408"/>
+                    <a:ext cx="720000" cy="540000"/>
+                  </a:xfrm>
+                  <a:prstGeom prst="rect">
+                    <a:avLst/>
+                  </a:prstGeom>
+                  <a:noFill/>
+                  <a:ln w="47625">
+                    <a:solidFill>
+                      <a:schemeClr val="tx1"/>
+                    </a:solidFill>
+                  </a:ln>
+                </p:spPr>
+                <p:txBody>
+                  <a:bodyPr wrap="square" rtlCol="0">
+                    <a:spAutoFit/>
+                  </a:bodyPr>
+                  <a:lstStyle/>
+                  <a:p>
+                    <a:endParaRPr lang="en-US" dirty="0"/>
+                  </a:p>
+                </p:txBody>
+              </p:sp>
+              <p:sp>
+                <p:nvSpPr>
+                  <p:cNvPr id="52" name="TextBox 51">
+                    <a:extLst>
+                      <a:ext uri="{FF2B5EF4-FFF2-40B4-BE49-F238E27FC236}">
+                        <a16:creationId xmlns:a16="http://schemas.microsoft.com/office/drawing/2014/main" id="{B4427196-4F50-4B41-90C8-5F72CCB5AE97}"/>
+                      </a:ext>
+                    </a:extLst>
+                  </p:cNvPr>
+                  <p:cNvSpPr txBox="1"/>
+                  <p:nvPr/>
+                </p:nvSpPr>
+                <p:spPr>
+                  <a:xfrm>
+                    <a:off x="8067794" y="658408"/>
+                    <a:ext cx="720000" cy="540000"/>
+                  </a:xfrm>
+                  <a:prstGeom prst="rect">
+                    <a:avLst/>
+                  </a:prstGeom>
+                  <a:noFill/>
+                  <a:ln w="47625">
+                    <a:solidFill>
+                      <a:schemeClr val="tx1"/>
+                    </a:solidFill>
+                  </a:ln>
+                </p:spPr>
+                <p:txBody>
+                  <a:bodyPr wrap="square" rtlCol="0">
+                    <a:spAutoFit/>
+                  </a:bodyPr>
+                  <a:lstStyle/>
+                  <a:p>
+                    <a:endParaRPr lang="en-US" dirty="0"/>
+                  </a:p>
+                </p:txBody>
+              </p:sp>
+            </p:grpSp>
+            <p:sp>
+              <p:nvSpPr>
+                <p:cNvPr id="45" name="TextBox 44">
+                  <a:extLst>
+                    <a:ext uri="{FF2B5EF4-FFF2-40B4-BE49-F238E27FC236}">
+                      <a16:creationId xmlns:a16="http://schemas.microsoft.com/office/drawing/2014/main" id="{D468C439-9409-E147-9419-E0D063E958A0}"/>
+                    </a:ext>
+                  </a:extLst>
+                </p:cNvPr>
+                <p:cNvSpPr txBox="1"/>
+                <p:nvPr/>
+              </p:nvSpPr>
+              <p:spPr>
+                <a:xfrm>
+                  <a:off x="1573971" y="1298488"/>
+                  <a:ext cx="3276697" cy="523220"/>
+                </a:xfrm>
+                <a:prstGeom prst="rect">
+                  <a:avLst/>
+                </a:prstGeom>
+                <a:noFill/>
+              </p:spPr>
+              <p:txBody>
+                <a:bodyPr wrap="square" rtlCol="0">
+                  <a:spAutoFit/>
+                </a:bodyPr>
+                <a:lstStyle/>
+                <a:p>
+                  <a:r>
+                    <a:rPr lang="en-US" sz="2800" dirty="0"/>
+                    <a:t>A</a:t>
+                  </a:r>
+                  <a:r>
+                    <a:rPr lang="en-US" sz="2000" baseline="-25000" dirty="0"/>
+                    <a:t>2</a:t>
+                  </a:r>
+                  <a:r>
+                    <a:rPr lang="en-US" sz="2800" dirty="0"/>
+                    <a:t> A</a:t>
+                  </a:r>
+                  <a:r>
+                    <a:rPr lang="en-US" sz="2000" baseline="-25000" dirty="0"/>
+                    <a:t>2   </a:t>
+                  </a:r>
+                  <a:r>
+                    <a:rPr lang="en-US" sz="2800" dirty="0"/>
+                    <a:t>A</a:t>
+                  </a:r>
+                  <a:r>
+                    <a:rPr lang="en-US" sz="2000" baseline="-25000" dirty="0"/>
+                    <a:t>2</a:t>
+                  </a:r>
+                  <a:r>
+                    <a:rPr lang="en-US" sz="2800" baseline="-25000" dirty="0"/>
+                    <a:t>  </a:t>
+                  </a:r>
+                  <a:r>
+                    <a:rPr lang="en-US" sz="2800" dirty="0"/>
+                    <a:t>A</a:t>
+                  </a:r>
+                  <a:r>
+                    <a:rPr lang="en-US" sz="2000" baseline="-25000" dirty="0"/>
+                    <a:t>2</a:t>
+                  </a:r>
+                  <a:r>
+                    <a:rPr lang="en-US" sz="2800" baseline="-25000" dirty="0"/>
+                    <a:t>  </a:t>
+                  </a:r>
+                  <a:r>
+                    <a:rPr lang="en-US" sz="2800" dirty="0"/>
+                    <a:t>A</a:t>
+                  </a:r>
+                  <a:r>
+                    <a:rPr lang="en-US" sz="2000" baseline="-25000" dirty="0"/>
+                    <a:t>1</a:t>
+                  </a:r>
+                  <a:r>
+                    <a:rPr lang="en-US" sz="2800" baseline="-25000" dirty="0"/>
+                    <a:t>  </a:t>
+                  </a:r>
+                  <a:r>
+                    <a:rPr lang="en-US" sz="2800" dirty="0"/>
+                    <a:t>A</a:t>
+                  </a:r>
+                  <a:r>
+                    <a:rPr lang="en-US" sz="2000" baseline="-25000" dirty="0"/>
+                    <a:t>1</a:t>
+                  </a:r>
+                  <a:r>
+                    <a:rPr lang="en-US" sz="2800" baseline="-25000" dirty="0"/>
+                    <a:t>  </a:t>
+                  </a:r>
+                  <a:r>
+                    <a:rPr lang="en-US" sz="2800" dirty="0"/>
+                    <a:t>A</a:t>
+                  </a:r>
+                  <a:r>
+                    <a:rPr lang="en-US" sz="2000" baseline="-25000" dirty="0"/>
+                    <a:t>1</a:t>
+                  </a:r>
+                  <a:r>
+                    <a:rPr lang="en-US" sz="2400" baseline="-25000" dirty="0"/>
+                    <a:t> </a:t>
+                  </a:r>
+                  <a:r>
+                    <a:rPr lang="en-US" sz="2800" dirty="0"/>
+                    <a:t>A</a:t>
+                  </a:r>
+                  <a:r>
+                    <a:rPr lang="en-US" sz="2000" baseline="-25000" dirty="0"/>
+                    <a:t>1</a:t>
+                  </a:r>
+                  <a:endParaRPr lang="en-US" sz="2800" baseline="-25000" dirty="0"/>
+                </a:p>
+              </p:txBody>
+            </p:sp>
+          </p:grpSp>
+          <p:sp>
+            <p:nvSpPr>
+              <p:cNvPr id="43" name="TextBox 42">
+                <a:extLst>
+                  <a:ext uri="{FF2B5EF4-FFF2-40B4-BE49-F238E27FC236}">
+                    <a16:creationId xmlns:a16="http://schemas.microsoft.com/office/drawing/2014/main" id="{646F9795-1AFC-B245-8176-B8472FCF76E7}"/>
+                  </a:ext>
+                </a:extLst>
+              </p:cNvPr>
+              <p:cNvSpPr txBox="1"/>
+              <p:nvPr/>
+            </p:nvSpPr>
+            <p:spPr>
+              <a:xfrm>
+                <a:off x="2978604" y="509314"/>
+                <a:ext cx="5047408" cy="540000"/>
+              </a:xfrm>
+              <a:prstGeom prst="rect">
+                <a:avLst/>
+              </a:prstGeom>
+              <a:solidFill>
+                <a:schemeClr val="bg1"/>
+              </a:solidFill>
+              <a:ln w="47625">
+                <a:noFill/>
+              </a:ln>
+            </p:spPr>
+            <p:txBody>
+              <a:bodyPr wrap="square" rtlCol="0">
+                <a:spAutoFit/>
+              </a:bodyPr>
+              <a:lstStyle/>
+              <a:p>
+                <a:endParaRPr lang="en-US" dirty="0"/>
+              </a:p>
+            </p:txBody>
+          </p:sp>
+        </p:grpSp>
+        <p:sp>
+          <p:nvSpPr>
+            <p:cNvPr id="38" name="TextBox 37">
+              <a:extLst>
+                <a:ext uri="{FF2B5EF4-FFF2-40B4-BE49-F238E27FC236}">
+                  <a16:creationId xmlns:a16="http://schemas.microsoft.com/office/drawing/2014/main" id="{D2EFAF1E-F589-674D-8A98-F5A80DAB4B2F}"/>
+                </a:ext>
+              </a:extLst>
+            </p:cNvPr>
+            <p:cNvSpPr txBox="1"/>
+            <p:nvPr/>
+          </p:nvSpPr>
+          <p:spPr>
+            <a:xfrm>
+              <a:off x="4842203" y="2588786"/>
+              <a:ext cx="1520160" cy="369332"/>
+            </a:xfrm>
+            <a:prstGeom prst="rect">
+              <a:avLst/>
+            </a:prstGeom>
+            <a:noFill/>
+          </p:spPr>
+          <p:txBody>
+            <a:bodyPr wrap="none" rtlCol="0">
+              <a:spAutoFit/>
+            </a:bodyPr>
+            <a:lstStyle/>
+            <a:p>
+              <a:r>
+                <a:rPr lang="en-US" dirty="0"/>
+                <a:t>12-bit address</a:t>
+              </a:r>
+            </a:p>
+          </p:txBody>
+        </p:sp>
+        <p:sp>
+          <p:nvSpPr>
+            <p:cNvPr id="39" name="Right Arrow 38">
+              <a:extLst>
+                <a:ext uri="{FF2B5EF4-FFF2-40B4-BE49-F238E27FC236}">
+                  <a16:creationId xmlns:a16="http://schemas.microsoft.com/office/drawing/2014/main" id="{AD04BC02-89E4-A744-B2C1-99BE0C85F7BA}"/>
+                </a:ext>
+              </a:extLst>
+            </p:cNvPr>
+            <p:cNvSpPr/>
+            <p:nvPr/>
+          </p:nvSpPr>
+          <p:spPr>
+            <a:xfrm rot="16200000">
+              <a:off x="5468256" y="2362921"/>
+              <a:ext cx="306893" cy="129746"/>
+            </a:xfrm>
+            <a:prstGeom prst="rightArrow">
+              <a:avLst/>
+            </a:prstGeom>
+          </p:spPr>
+          <p:style>
+            <a:lnRef idx="0">
+              <a:schemeClr val="accent6"/>
+            </a:lnRef>
+            <a:fillRef idx="3">
+              <a:schemeClr val="accent6"/>
+            </a:fillRef>
+            <a:effectRef idx="3">
+              <a:schemeClr val="accent6"/>
+            </a:effectRef>
+            <a:fontRef idx="minor">
+              <a:schemeClr val="lt1"/>
+            </a:fontRef>
+          </p:style>
+          <p:txBody>
+            <a:bodyPr rtlCol="0" anchor="ctr">
+              <a:scene3d>
+                <a:camera prst="orthographicFront"/>
+                <a:lightRig rig="soft" dir="t">
+                  <a:rot lat="0" lon="0" rev="15600000"/>
+                </a:lightRig>
+              </a:scene3d>
+              <a:sp3d extrusionH="57150" prstMaterial="softEdge">
+                <a:bevelT w="25400" h="38100"/>
+              </a:sp3d>
+            </a:bodyPr>
+            <a:lstStyle/>
+            <a:p>
+              <a:pPr algn="ctr"/>
+              <a:endParaRPr lang="en-US" b="1">
+                <a:ln/>
+                <a:solidFill>
+                  <a:schemeClr val="accent4"/>
+                </a:solidFill>
+              </a:endParaRPr>
+            </a:p>
+          </p:txBody>
+        </p:sp>
+      </p:grpSp>
+      <p:grpSp>
+        <p:nvGrpSpPr>
+          <p:cNvPr id="63" name="Group 62">
+            <a:extLst>
+              <a:ext uri="{FF2B5EF4-FFF2-40B4-BE49-F238E27FC236}">
+                <a16:creationId xmlns:a16="http://schemas.microsoft.com/office/drawing/2014/main" id="{481175A5-787F-7242-99C4-F25EA188137A}"/>
+              </a:ext>
+            </a:extLst>
+          </p:cNvPr>
+          <p:cNvGrpSpPr/>
+          <p:nvPr/>
+        </p:nvGrpSpPr>
+        <p:grpSpPr>
+          <a:xfrm>
+            <a:off x="3348026" y="3020436"/>
+            <a:ext cx="884905" cy="1160390"/>
+            <a:chOff x="4547031" y="4518057"/>
+            <a:chExt cx="884905" cy="1160390"/>
+          </a:xfrm>
+        </p:grpSpPr>
+        <p:grpSp>
+          <p:nvGrpSpPr>
+            <p:cNvPr id="64" name="Group 63">
+              <a:extLst>
+                <a:ext uri="{FF2B5EF4-FFF2-40B4-BE49-F238E27FC236}">
+                  <a16:creationId xmlns:a16="http://schemas.microsoft.com/office/drawing/2014/main" id="{5DD70D8D-8E9D-4649-A738-70CBF2170C08}"/>
+                </a:ext>
+              </a:extLst>
+            </p:cNvPr>
+            <p:cNvGrpSpPr/>
+            <p:nvPr/>
+          </p:nvGrpSpPr>
+          <p:grpSpPr>
+            <a:xfrm>
+              <a:off x="4547032" y="4926685"/>
+              <a:ext cx="884904" cy="667015"/>
+              <a:chOff x="4366926" y="4826186"/>
+              <a:chExt cx="884904" cy="667015"/>
+            </a:xfrm>
+          </p:grpSpPr>
+          <p:sp>
+            <p:nvSpPr>
+              <p:cNvPr id="68" name="TextBox 67">
+                <a:extLst>
+                  <a:ext uri="{FF2B5EF4-FFF2-40B4-BE49-F238E27FC236}">
+                    <a16:creationId xmlns:a16="http://schemas.microsoft.com/office/drawing/2014/main" id="{D670EF51-1013-E945-A323-B43EBCEB49AD}"/>
+                  </a:ext>
+                </a:extLst>
+              </p:cNvPr>
+              <p:cNvSpPr txBox="1"/>
+              <p:nvPr/>
+            </p:nvSpPr>
+            <p:spPr>
+              <a:xfrm>
+                <a:off x="4817096" y="4826186"/>
+                <a:ext cx="434734" cy="369332"/>
+              </a:xfrm>
+              <a:prstGeom prst="rect">
+                <a:avLst/>
+              </a:prstGeom>
+              <a:noFill/>
+            </p:spPr>
+            <p:txBody>
+              <a:bodyPr wrap="none" rtlCol="0">
+                <a:spAutoFit/>
+              </a:bodyPr>
+              <a:lstStyle/>
+              <a:p>
+                <a:r>
+                  <a:rPr lang="en-US" dirty="0"/>
+                  <a:t>P</a:t>
+                </a:r>
+                <a:r>
+                  <a:rPr lang="en-US" baseline="-25000" dirty="0"/>
+                  <a:t>M</a:t>
+                </a:r>
+              </a:p>
+            </p:txBody>
+          </p:sp>
+          <p:sp>
+            <p:nvSpPr>
+              <p:cNvPr id="69" name="Right Arrow 68">
+                <a:extLst>
+                  <a:ext uri="{FF2B5EF4-FFF2-40B4-BE49-F238E27FC236}">
+                    <a16:creationId xmlns:a16="http://schemas.microsoft.com/office/drawing/2014/main" id="{AB939C56-F838-C849-AECE-725C8C4F9BA1}"/>
+                  </a:ext>
+                </a:extLst>
+              </p:cNvPr>
+              <p:cNvSpPr/>
+              <p:nvPr/>
+            </p:nvSpPr>
+            <p:spPr>
+              <a:xfrm>
+                <a:off x="4366926" y="4930946"/>
+                <a:ext cx="306893" cy="129746"/>
+              </a:xfrm>
+              <a:prstGeom prst="rightArrow">
+                <a:avLst/>
+              </a:prstGeom>
+            </p:spPr>
+            <p:style>
+              <a:lnRef idx="0">
+                <a:schemeClr val="accent6"/>
+              </a:lnRef>
+              <a:fillRef idx="3">
+                <a:schemeClr val="accent6"/>
+              </a:fillRef>
+              <a:effectRef idx="3">
+                <a:schemeClr val="accent6"/>
+              </a:effectRef>
+              <a:fontRef idx="minor">
+                <a:schemeClr val="lt1"/>
+              </a:fontRef>
+            </p:style>
+            <p:txBody>
+              <a:bodyPr rtlCol="0" anchor="ctr">
+                <a:scene3d>
+                  <a:camera prst="orthographicFront"/>
+                  <a:lightRig rig="soft" dir="t">
+                    <a:rot lat="0" lon="0" rev="15600000"/>
+                  </a:lightRig>
+                </a:scene3d>
+                <a:sp3d extrusionH="57150" prstMaterial="softEdge">
+                  <a:bevelT w="25400" h="38100"/>
+                </a:sp3d>
+              </a:bodyPr>
+              <a:lstStyle/>
+              <a:p>
+                <a:pPr algn="ctr"/>
+                <a:endParaRPr lang="en-US" b="1">
+                  <a:ln/>
+                  <a:solidFill>
+                    <a:schemeClr val="accent4"/>
+                  </a:solidFill>
+                </a:endParaRPr>
+              </a:p>
+            </p:txBody>
+          </p:sp>
+          <p:sp>
+            <p:nvSpPr>
+              <p:cNvPr id="70" name="Right Arrow 69">
+                <a:extLst>
+                  <a:ext uri="{FF2B5EF4-FFF2-40B4-BE49-F238E27FC236}">
+                    <a16:creationId xmlns:a16="http://schemas.microsoft.com/office/drawing/2014/main" id="{BED18F56-8FAE-BA4E-9CFD-84429477C2C6}"/>
+                  </a:ext>
+                </a:extLst>
+              </p:cNvPr>
+              <p:cNvSpPr/>
+              <p:nvPr/>
+            </p:nvSpPr>
+            <p:spPr>
+              <a:xfrm>
+                <a:off x="4366926" y="5363455"/>
+                <a:ext cx="306893" cy="129746"/>
+              </a:xfrm>
+              <a:prstGeom prst="rightArrow">
+                <a:avLst/>
+              </a:prstGeom>
+            </p:spPr>
+            <p:style>
+              <a:lnRef idx="0">
+                <a:schemeClr val="accent6"/>
+              </a:lnRef>
+              <a:fillRef idx="3">
+                <a:schemeClr val="accent6"/>
+              </a:fillRef>
+              <a:effectRef idx="3">
+                <a:schemeClr val="accent6"/>
+              </a:effectRef>
+              <a:fontRef idx="minor">
+                <a:schemeClr val="lt1"/>
+              </a:fontRef>
+            </p:style>
+            <p:txBody>
+              <a:bodyPr rtlCol="0" anchor="ctr">
+                <a:scene3d>
+                  <a:camera prst="orthographicFront"/>
+                  <a:lightRig rig="soft" dir="t">
+                    <a:rot lat="0" lon="0" rev="15600000"/>
+                  </a:lightRig>
+                </a:scene3d>
+                <a:sp3d extrusionH="57150" prstMaterial="softEdge">
+                  <a:bevelT w="25400" h="38100"/>
+                </a:sp3d>
+              </a:bodyPr>
+              <a:lstStyle/>
+              <a:p>
+                <a:pPr algn="ctr"/>
+                <a:endParaRPr lang="en-US" b="1">
+                  <a:ln/>
+                  <a:solidFill>
+                    <a:schemeClr val="accent4"/>
+                  </a:solidFill>
+                </a:endParaRPr>
+              </a:p>
+            </p:txBody>
+          </p:sp>
+        </p:grpSp>
+        <p:sp>
+          <p:nvSpPr>
+            <p:cNvPr id="65" name="TextBox 64">
+              <a:extLst>
+                <a:ext uri="{FF2B5EF4-FFF2-40B4-BE49-F238E27FC236}">
+                  <a16:creationId xmlns:a16="http://schemas.microsoft.com/office/drawing/2014/main" id="{C3721BCC-873A-5848-B0DE-3B24A3B613AE}"/>
+                </a:ext>
+              </a:extLst>
+            </p:cNvPr>
+            <p:cNvSpPr txBox="1"/>
+            <p:nvPr/>
+          </p:nvSpPr>
+          <p:spPr>
+            <a:xfrm>
+              <a:off x="4997202" y="5309115"/>
+              <a:ext cx="367408" cy="369332"/>
+            </a:xfrm>
+            <a:prstGeom prst="rect">
+              <a:avLst/>
+            </a:prstGeom>
+            <a:noFill/>
+          </p:spPr>
+          <p:txBody>
+            <a:bodyPr wrap="none" rtlCol="0">
+              <a:spAutoFit/>
+            </a:bodyPr>
+            <a:lstStyle/>
+            <a:p>
+              <a:r>
+                <a:rPr lang="en-US" dirty="0"/>
+                <a:t>P</a:t>
+              </a:r>
+              <a:r>
+                <a:rPr lang="en-US" baseline="-25000" dirty="0"/>
+                <a:t>L</a:t>
+              </a:r>
+            </a:p>
+          </p:txBody>
+        </p:sp>
+        <p:sp>
+          <p:nvSpPr>
+            <p:cNvPr id="66" name="TextBox 65">
+              <a:extLst>
+                <a:ext uri="{FF2B5EF4-FFF2-40B4-BE49-F238E27FC236}">
+                  <a16:creationId xmlns:a16="http://schemas.microsoft.com/office/drawing/2014/main" id="{771E4AEE-7E55-424C-8B6F-89150F0DE93E}"/>
+                </a:ext>
+              </a:extLst>
+            </p:cNvPr>
+            <p:cNvSpPr txBox="1"/>
+            <p:nvPr/>
+          </p:nvSpPr>
+          <p:spPr>
+            <a:xfrm>
+              <a:off x="4999039" y="4518057"/>
+              <a:ext cx="399468" cy="369332"/>
+            </a:xfrm>
+            <a:prstGeom prst="rect">
+              <a:avLst/>
+            </a:prstGeom>
+            <a:noFill/>
+          </p:spPr>
+          <p:txBody>
+            <a:bodyPr wrap="none" rtlCol="0">
+              <a:spAutoFit/>
+            </a:bodyPr>
+            <a:lstStyle/>
+            <a:p>
+              <a:r>
+                <a:rPr lang="en-US" dirty="0"/>
+                <a:t>P</a:t>
+              </a:r>
+              <a:r>
+                <a:rPr lang="en-US" baseline="-25000" dirty="0"/>
+                <a:t>H</a:t>
+              </a:r>
+            </a:p>
+          </p:txBody>
+        </p:sp>
+        <p:sp>
+          <p:nvSpPr>
+            <p:cNvPr id="67" name="Right Arrow 66">
+              <a:extLst>
+                <a:ext uri="{FF2B5EF4-FFF2-40B4-BE49-F238E27FC236}">
+                  <a16:creationId xmlns:a16="http://schemas.microsoft.com/office/drawing/2014/main" id="{F5291965-D616-5C42-A1EE-1C85D42B16BB}"/>
+                </a:ext>
+              </a:extLst>
+            </p:cNvPr>
+            <p:cNvSpPr/>
+            <p:nvPr/>
+          </p:nvSpPr>
+          <p:spPr>
+            <a:xfrm>
+              <a:off x="4547031" y="4641548"/>
+              <a:ext cx="306893" cy="129746"/>
+            </a:xfrm>
+            <a:prstGeom prst="rightArrow">
+              <a:avLst/>
+            </a:prstGeom>
+          </p:spPr>
+          <p:style>
+            <a:lnRef idx="0">
+              <a:schemeClr val="accent6"/>
+            </a:lnRef>
+            <a:fillRef idx="3">
+              <a:schemeClr val="accent6"/>
+            </a:fillRef>
+            <a:effectRef idx="3">
+              <a:schemeClr val="accent6"/>
+            </a:effectRef>
+            <a:fontRef idx="minor">
+              <a:schemeClr val="lt1"/>
+            </a:fontRef>
+          </p:style>
+          <p:txBody>
+            <a:bodyPr rtlCol="0" anchor="ctr">
+              <a:scene3d>
+                <a:camera prst="orthographicFront"/>
+                <a:lightRig rig="soft" dir="t">
+                  <a:rot lat="0" lon="0" rev="15600000"/>
+                </a:lightRig>
+              </a:scene3d>
+              <a:sp3d extrusionH="57150" prstMaterial="softEdge">
+                <a:bevelT w="25400" h="38100"/>
+              </a:sp3d>
+            </a:bodyPr>
+            <a:lstStyle/>
+            <a:p>
+              <a:pPr algn="ctr"/>
+              <a:endParaRPr lang="en-US" b="1">
+                <a:ln/>
+                <a:solidFill>
+                  <a:schemeClr val="accent4"/>
+                </a:solidFill>
+              </a:endParaRPr>
+            </a:p>
+          </p:txBody>
+        </p:sp>
+      </p:grpSp>
+      <p:sp>
+        <p:nvSpPr>
+          <p:cNvPr id="71" name="Rectangle 70">
+            <a:extLst>
+              <a:ext uri="{FF2B5EF4-FFF2-40B4-BE49-F238E27FC236}">
+                <a16:creationId xmlns:a16="http://schemas.microsoft.com/office/drawing/2014/main" id="{71562554-69DA-ED44-A01A-E86226307CCC}"/>
+              </a:ext>
+            </a:extLst>
+          </p:cNvPr>
+          <p:cNvSpPr/>
+          <p:nvPr/>
+        </p:nvSpPr>
+        <p:spPr>
+          <a:xfrm>
+            <a:off x="2158684" y="3007337"/>
+            <a:ext cx="2304769" cy="369332"/>
+          </a:xfrm>
+          <a:prstGeom prst="rect">
+            <a:avLst/>
+          </a:prstGeom>
+        </p:spPr>
+        <p:txBody>
+          <a:bodyPr wrap="square">
+            <a:spAutoFit/>
+          </a:bodyPr>
+          <a:lstStyle/>
+          <a:p>
+            <a:r>
+              <a:rPr lang="en-US" dirty="0"/>
+              <a:t>A</a:t>
+            </a:r>
+            <a:r>
+              <a:rPr lang="en-US" baseline="-25000" dirty="0"/>
+              <a:t>3 </a:t>
+            </a:r>
+            <a:r>
+              <a:rPr lang="en-US" dirty="0"/>
+              <a:t>A</a:t>
+            </a:r>
+            <a:r>
+              <a:rPr lang="en-US" baseline="-25000" dirty="0"/>
+              <a:t>3</a:t>
+            </a:r>
+            <a:r>
+              <a:rPr lang="en-US" dirty="0"/>
+              <a:t> A</a:t>
+            </a:r>
+            <a:r>
+              <a:rPr lang="en-US" baseline="-25000" dirty="0"/>
+              <a:t>3</a:t>
+            </a:r>
+            <a:r>
+              <a:rPr lang="en-US" dirty="0"/>
+              <a:t> A</a:t>
+            </a:r>
+            <a:r>
+              <a:rPr lang="en-US" baseline="-25000" dirty="0"/>
+              <a:t>3</a:t>
+            </a:r>
+            <a:r>
+              <a:rPr lang="en-US" dirty="0"/>
+              <a:t> </a:t>
+            </a:r>
+          </a:p>
+        </p:txBody>
+      </p:sp>
+      <p:sp>
+        <p:nvSpPr>
+          <p:cNvPr id="72" name="Rectangle 71">
+            <a:extLst>
+              <a:ext uri="{FF2B5EF4-FFF2-40B4-BE49-F238E27FC236}">
+                <a16:creationId xmlns:a16="http://schemas.microsoft.com/office/drawing/2014/main" id="{02E1C655-CD82-9149-AFF3-18DBC8CBA733}"/>
+              </a:ext>
+            </a:extLst>
+          </p:cNvPr>
+          <p:cNvSpPr/>
+          <p:nvPr/>
+        </p:nvSpPr>
+        <p:spPr>
+          <a:xfrm>
+            <a:off x="2158684" y="3408206"/>
+            <a:ext cx="2304769" cy="369332"/>
+          </a:xfrm>
+          <a:prstGeom prst="rect">
+            <a:avLst/>
+          </a:prstGeom>
+        </p:spPr>
+        <p:txBody>
+          <a:bodyPr wrap="square">
+            <a:spAutoFit/>
+          </a:bodyPr>
+          <a:lstStyle/>
+          <a:p>
+            <a:r>
+              <a:rPr lang="en-US" dirty="0"/>
+              <a:t>A</a:t>
+            </a:r>
+            <a:r>
+              <a:rPr lang="en-US" baseline="-25000" dirty="0"/>
+              <a:t>2 </a:t>
+            </a:r>
+            <a:r>
+              <a:rPr lang="en-US" dirty="0"/>
+              <a:t>A</a:t>
+            </a:r>
+            <a:r>
+              <a:rPr lang="en-US" baseline="-25000" dirty="0"/>
+              <a:t>2</a:t>
+            </a:r>
+            <a:r>
+              <a:rPr lang="en-US" dirty="0"/>
+              <a:t> A</a:t>
+            </a:r>
+            <a:r>
+              <a:rPr lang="en-US" baseline="-25000" dirty="0"/>
+              <a:t>2</a:t>
+            </a:r>
+            <a:r>
+              <a:rPr lang="en-US" dirty="0"/>
+              <a:t> A</a:t>
+            </a:r>
+            <a:r>
+              <a:rPr lang="en-US" baseline="-25000" dirty="0"/>
+              <a:t>2</a:t>
+            </a:r>
+            <a:r>
+              <a:rPr lang="en-US" dirty="0"/>
+              <a:t> </a:t>
+            </a:r>
+          </a:p>
+        </p:txBody>
+      </p:sp>
+      <p:sp>
+        <p:nvSpPr>
+          <p:cNvPr id="73" name="Rectangle 72">
+            <a:extLst>
+              <a:ext uri="{FF2B5EF4-FFF2-40B4-BE49-F238E27FC236}">
+                <a16:creationId xmlns:a16="http://schemas.microsoft.com/office/drawing/2014/main" id="{DFC518CF-47C5-4C41-B7E5-E29CC13F3A00}"/>
+              </a:ext>
+            </a:extLst>
+          </p:cNvPr>
+          <p:cNvSpPr/>
+          <p:nvPr/>
+        </p:nvSpPr>
+        <p:spPr>
+          <a:xfrm>
+            <a:off x="2158684" y="3801960"/>
+            <a:ext cx="2304769" cy="369332"/>
+          </a:xfrm>
+          <a:prstGeom prst="rect">
+            <a:avLst/>
+          </a:prstGeom>
+        </p:spPr>
+        <p:txBody>
+          <a:bodyPr wrap="square">
+            <a:spAutoFit/>
+          </a:bodyPr>
+          <a:lstStyle/>
+          <a:p>
+            <a:r>
+              <a:rPr lang="en-US" dirty="0"/>
+              <a:t>A</a:t>
+            </a:r>
+            <a:r>
+              <a:rPr lang="en-US" baseline="-25000" dirty="0"/>
+              <a:t>1 </a:t>
+            </a:r>
+            <a:r>
+              <a:rPr lang="en-US" dirty="0"/>
+              <a:t>A</a:t>
+            </a:r>
+            <a:r>
+              <a:rPr lang="en-US" baseline="-25000" dirty="0"/>
+              <a:t>1</a:t>
+            </a:r>
+            <a:r>
+              <a:rPr lang="en-US" dirty="0"/>
+              <a:t> A</a:t>
+            </a:r>
+            <a:r>
+              <a:rPr lang="en-US" baseline="-25000" dirty="0"/>
+              <a:t>1</a:t>
+            </a:r>
+            <a:r>
+              <a:rPr lang="en-US" dirty="0"/>
+              <a:t> A</a:t>
+            </a:r>
+            <a:r>
+              <a:rPr lang="en-US" baseline="-25000" dirty="0"/>
+              <a:t>1</a:t>
+            </a:r>
+            <a:r>
+              <a:rPr lang="en-US" dirty="0"/>
+              <a:t> </a:t>
+            </a:r>
+          </a:p>
+        </p:txBody>
+      </p:sp>
+      <p:sp>
+        <p:nvSpPr>
+          <p:cNvPr id="61" name="Rectangle 60">
+            <a:extLst>
+              <a:ext uri="{FF2B5EF4-FFF2-40B4-BE49-F238E27FC236}">
+                <a16:creationId xmlns:a16="http://schemas.microsoft.com/office/drawing/2014/main" id="{CB068ACE-0122-F544-9C5B-4DF95C142F35}"/>
+              </a:ext>
+            </a:extLst>
+          </p:cNvPr>
+          <p:cNvSpPr/>
+          <p:nvPr/>
+        </p:nvSpPr>
+        <p:spPr>
+          <a:xfrm>
+            <a:off x="585468" y="5631808"/>
+            <a:ext cx="3337313" cy="369332"/>
+          </a:xfrm>
+          <a:prstGeom prst="rect">
+            <a:avLst/>
+          </a:prstGeom>
+        </p:spPr>
+        <p:txBody>
+          <a:bodyPr wrap="square">
+            <a:spAutoFit/>
+          </a:bodyPr>
+          <a:lstStyle/>
+          <a:p>
+            <a:r>
+              <a:rPr lang="en-US" dirty="0"/>
+              <a:t>( (P</a:t>
+            </a:r>
+            <a:r>
+              <a:rPr lang="en-US" baseline="-25000" dirty="0"/>
+              <a:t>H</a:t>
+            </a:r>
+            <a:r>
+              <a:rPr lang="en-US" dirty="0"/>
+              <a:t>) . (R</a:t>
+            </a:r>
+            <a:r>
+              <a:rPr lang="en-US" baseline="-25000" dirty="0"/>
+              <a:t>0</a:t>
+            </a:r>
+            <a:r>
+              <a:rPr lang="en-US" dirty="0"/>
+              <a:t>) . (R</a:t>
+            </a:r>
+            <a:r>
+              <a:rPr lang="en-US" baseline="-25000" dirty="0"/>
+              <a:t>1</a:t>
+            </a:r>
+            <a:r>
+              <a:rPr lang="en-US" dirty="0"/>
+              <a:t>) )          </a:t>
+            </a:r>
+            <a:r>
+              <a:rPr lang="en-US" dirty="0" err="1"/>
+              <a:t>RP</a:t>
+            </a:r>
+            <a:r>
+              <a:rPr lang="en-US" baseline="-25000" dirty="0" err="1"/>
+              <a:t>p</a:t>
+            </a:r>
+            <a:endParaRPr lang="en-US" dirty="0"/>
+          </a:p>
+        </p:txBody>
+      </p:sp>
+      <p:sp>
+        <p:nvSpPr>
+          <p:cNvPr id="62" name="Right Arrow 61">
+            <a:extLst>
+              <a:ext uri="{FF2B5EF4-FFF2-40B4-BE49-F238E27FC236}">
+                <a16:creationId xmlns:a16="http://schemas.microsoft.com/office/drawing/2014/main" id="{0DFF2C6C-00C7-E54F-BD57-E4527A744C93}"/>
+              </a:ext>
+            </a:extLst>
+          </p:cNvPr>
+          <p:cNvSpPr/>
+          <p:nvPr/>
+        </p:nvSpPr>
+        <p:spPr>
+          <a:xfrm>
+            <a:off x="2400574" y="5762614"/>
+            <a:ext cx="306893" cy="129746"/>
+          </a:xfrm>
+          <a:prstGeom prst="rightArrow">
+            <a:avLst/>
+          </a:prstGeom>
+        </p:spPr>
+        <p:style>
+          <a:lnRef idx="0">
+            <a:schemeClr val="accent6"/>
+          </a:lnRef>
+          <a:fillRef idx="3">
+            <a:schemeClr val="accent6"/>
+          </a:fillRef>
+          <a:effectRef idx="3">
+            <a:schemeClr val="accent6"/>
+          </a:effectRef>
+          <a:fontRef idx="minor">
+            <a:schemeClr val="lt1"/>
+          </a:fontRef>
+        </p:style>
+        <p:txBody>
+          <a:bodyPr rtlCol="0" anchor="ctr">
+            <a:scene3d>
+              <a:camera prst="orthographicFront"/>
+              <a:lightRig rig="soft" dir="t">
+                <a:rot lat="0" lon="0" rev="15600000"/>
+              </a:lightRig>
+            </a:scene3d>
+            <a:sp3d extrusionH="57150" prstMaterial="softEdge">
+              <a:bevelT w="25400" h="38100"/>
+            </a:sp3d>
+          </a:bodyPr>
+          <a:lstStyle/>
+          <a:p>
+            <a:pPr algn="ctr"/>
+            <a:endParaRPr lang="en-US" b="1">
+              <a:ln/>
+              <a:solidFill>
+                <a:schemeClr val="accent4"/>
+              </a:solidFill>
+            </a:endParaRPr>
+          </a:p>
+        </p:txBody>
+      </p:sp>
+      <p:sp>
+        <p:nvSpPr>
+          <p:cNvPr id="74" name="Rectangle 73">
+            <a:extLst>
+              <a:ext uri="{FF2B5EF4-FFF2-40B4-BE49-F238E27FC236}">
+                <a16:creationId xmlns:a16="http://schemas.microsoft.com/office/drawing/2014/main" id="{2DA033E7-6424-7046-8E07-8C497D262C48}"/>
+              </a:ext>
+            </a:extLst>
+          </p:cNvPr>
+          <p:cNvSpPr/>
+          <p:nvPr/>
+        </p:nvSpPr>
+        <p:spPr>
+          <a:xfrm>
+            <a:off x="409634" y="6291505"/>
+            <a:ext cx="3548055" cy="369332"/>
+          </a:xfrm>
+          <a:prstGeom prst="rect">
+            <a:avLst/>
+          </a:prstGeom>
+        </p:spPr>
+        <p:txBody>
+          <a:bodyPr wrap="square">
+            <a:spAutoFit/>
+          </a:bodyPr>
+          <a:lstStyle/>
+          <a:p>
+            <a:r>
+              <a:rPr lang="en-US" dirty="0"/>
+              <a:t>( (P</a:t>
+            </a:r>
+            <a:r>
+              <a:rPr lang="en-US" baseline="-25000" dirty="0"/>
+              <a:t>H+1</a:t>
+            </a:r>
+            <a:r>
+              <a:rPr lang="en-US" dirty="0"/>
+              <a:t>) . (R</a:t>
+            </a:r>
+            <a:r>
+              <a:rPr lang="en-US" baseline="-25000" dirty="0"/>
+              <a:t>0</a:t>
+            </a:r>
+            <a:r>
+              <a:rPr lang="en-US" dirty="0"/>
+              <a:t>) . (R</a:t>
+            </a:r>
+            <a:r>
+              <a:rPr lang="en-US" baseline="-25000" dirty="0"/>
+              <a:t>1</a:t>
+            </a:r>
+            <a:r>
+              <a:rPr lang="en-US" dirty="0"/>
+              <a:t>) )          </a:t>
+            </a:r>
+            <a:r>
+              <a:rPr lang="en-US" dirty="0" err="1"/>
+              <a:t>RP</a:t>
+            </a:r>
+            <a:r>
+              <a:rPr lang="en-US" baseline="-25000" dirty="0" err="1"/>
+              <a:t>p</a:t>
+            </a:r>
+            <a:endParaRPr lang="en-US" dirty="0"/>
+          </a:p>
+        </p:txBody>
+      </p:sp>
+      <p:sp>
+        <p:nvSpPr>
+          <p:cNvPr id="75" name="Right Arrow 74">
+            <a:extLst>
+              <a:ext uri="{FF2B5EF4-FFF2-40B4-BE49-F238E27FC236}">
+                <a16:creationId xmlns:a16="http://schemas.microsoft.com/office/drawing/2014/main" id="{8FBCE37F-B207-3B42-8444-42C030DB13AD}"/>
+              </a:ext>
+            </a:extLst>
+          </p:cNvPr>
+          <p:cNvSpPr/>
+          <p:nvPr/>
+        </p:nvSpPr>
+        <p:spPr>
+          <a:xfrm>
+            <a:off x="2400574" y="6425893"/>
+            <a:ext cx="306893" cy="129746"/>
+          </a:xfrm>
+          <a:prstGeom prst="rightArrow">
+            <a:avLst/>
+          </a:prstGeom>
+        </p:spPr>
+        <p:style>
+          <a:lnRef idx="0">
+            <a:schemeClr val="accent6"/>
+          </a:lnRef>
+          <a:fillRef idx="3">
+            <a:schemeClr val="accent6"/>
+          </a:fillRef>
+          <a:effectRef idx="3">
+            <a:schemeClr val="accent6"/>
+          </a:effectRef>
+          <a:fontRef idx="minor">
+            <a:schemeClr val="lt1"/>
+          </a:fontRef>
+        </p:style>
+        <p:txBody>
+          <a:bodyPr rtlCol="0" anchor="ctr">
+            <a:scene3d>
+              <a:camera prst="orthographicFront"/>
+              <a:lightRig rig="soft" dir="t">
+                <a:rot lat="0" lon="0" rev="15600000"/>
+              </a:lightRig>
+            </a:scene3d>
+            <a:sp3d extrusionH="57150" prstMaterial="softEdge">
+              <a:bevelT w="25400" h="38100"/>
+            </a:sp3d>
+          </a:bodyPr>
+          <a:lstStyle/>
+          <a:p>
+            <a:pPr algn="ctr"/>
+            <a:endParaRPr lang="en-US" b="1">
+              <a:ln/>
+              <a:solidFill>
+                <a:schemeClr val="accent4"/>
+              </a:solidFill>
+            </a:endParaRPr>
+          </a:p>
+        </p:txBody>
+      </p:sp>
+      <p:sp>
+        <p:nvSpPr>
+          <p:cNvPr id="80" name="TextBox 79">
+            <a:extLst>
+              <a:ext uri="{FF2B5EF4-FFF2-40B4-BE49-F238E27FC236}">
+                <a16:creationId xmlns:a16="http://schemas.microsoft.com/office/drawing/2014/main" id="{98D93FF9-4288-3E4D-9F8E-4ED161C5D945}"/>
+              </a:ext>
+            </a:extLst>
+          </p:cNvPr>
+          <p:cNvSpPr txBox="1"/>
+          <p:nvPr/>
+        </p:nvSpPr>
+        <p:spPr>
+          <a:xfrm>
+            <a:off x="201760" y="5998635"/>
+            <a:ext cx="461986" cy="369332"/>
+          </a:xfrm>
+          <a:prstGeom prst="rect">
+            <a:avLst/>
+          </a:prstGeom>
+          <a:noFill/>
+        </p:spPr>
+        <p:txBody>
+          <a:bodyPr wrap="none" rtlCol="0">
+            <a:spAutoFit/>
+          </a:bodyPr>
+          <a:lstStyle/>
+          <a:p>
+            <a:r>
+              <a:rPr lang="en-US" dirty="0"/>
+              <a:t>OR</a:t>
+            </a:r>
+          </a:p>
+        </p:txBody>
+      </p:sp>
+      <p:grpSp>
+        <p:nvGrpSpPr>
+          <p:cNvPr id="92" name="Group 91">
+            <a:extLst>
+              <a:ext uri="{FF2B5EF4-FFF2-40B4-BE49-F238E27FC236}">
+                <a16:creationId xmlns:a16="http://schemas.microsoft.com/office/drawing/2014/main" id="{38C99C44-8E69-3C49-B544-C478CFB06405}"/>
+              </a:ext>
+            </a:extLst>
+          </p:cNvPr>
+          <p:cNvGrpSpPr/>
+          <p:nvPr/>
+        </p:nvGrpSpPr>
+        <p:grpSpPr>
+          <a:xfrm>
+            <a:off x="8893591" y="6425893"/>
+            <a:ext cx="955203" cy="369332"/>
+            <a:chOff x="4547031" y="4509216"/>
+            <a:chExt cx="955203" cy="369332"/>
+          </a:xfrm>
+        </p:grpSpPr>
+        <p:sp>
+          <p:nvSpPr>
+            <p:cNvPr id="93" name="TextBox 92">
+              <a:extLst>
+                <a:ext uri="{FF2B5EF4-FFF2-40B4-BE49-F238E27FC236}">
+                  <a16:creationId xmlns:a16="http://schemas.microsoft.com/office/drawing/2014/main" id="{81C32892-494E-A049-82C9-3FEC80CBCCFD}"/>
+                </a:ext>
+              </a:extLst>
+            </p:cNvPr>
+            <p:cNvSpPr txBox="1"/>
+            <p:nvPr/>
+          </p:nvSpPr>
+          <p:spPr>
+            <a:xfrm>
+              <a:off x="4817431" y="4509216"/>
+              <a:ext cx="684803" cy="369332"/>
+            </a:xfrm>
+            <a:prstGeom prst="rect">
+              <a:avLst/>
+            </a:prstGeom>
+            <a:noFill/>
+          </p:spPr>
+          <p:txBody>
+            <a:bodyPr wrap="none" rtlCol="0">
+              <a:spAutoFit/>
+            </a:bodyPr>
+            <a:lstStyle/>
+            <a:p>
+              <a:r>
+                <a:rPr lang="en-US" dirty="0"/>
+                <a:t>RRRR</a:t>
+              </a:r>
+              <a:endParaRPr lang="en-US" baseline="-25000" dirty="0"/>
+            </a:p>
+          </p:txBody>
+        </p:sp>
+        <p:sp>
+          <p:nvSpPr>
+            <p:cNvPr id="94" name="Right Arrow 93">
+              <a:extLst>
+                <a:ext uri="{FF2B5EF4-FFF2-40B4-BE49-F238E27FC236}">
+                  <a16:creationId xmlns:a16="http://schemas.microsoft.com/office/drawing/2014/main" id="{03CB11C9-1630-4D4E-A880-8A33C77FF6E4}"/>
+                </a:ext>
+              </a:extLst>
+            </p:cNvPr>
+            <p:cNvSpPr/>
+            <p:nvPr/>
+          </p:nvSpPr>
+          <p:spPr>
+            <a:xfrm>
+              <a:off x="4547031" y="4619776"/>
+              <a:ext cx="306893" cy="129746"/>
+            </a:xfrm>
+            <a:prstGeom prst="rightArrow">
+              <a:avLst/>
+            </a:prstGeom>
+          </p:spPr>
+          <p:style>
+            <a:lnRef idx="0">
+              <a:schemeClr val="accent6"/>
+            </a:lnRef>
+            <a:fillRef idx="3">
+              <a:schemeClr val="accent6"/>
+            </a:fillRef>
+            <a:effectRef idx="3">
+              <a:schemeClr val="accent6"/>
+            </a:effectRef>
+            <a:fontRef idx="minor">
+              <a:schemeClr val="lt1"/>
+            </a:fontRef>
+          </p:style>
+          <p:txBody>
+            <a:bodyPr rtlCol="0" anchor="ctr">
+              <a:scene3d>
+                <a:camera prst="orthographicFront"/>
+                <a:lightRig rig="soft" dir="t">
+                  <a:rot lat="0" lon="0" rev="15600000"/>
+                </a:lightRig>
+              </a:scene3d>
+              <a:sp3d extrusionH="57150" prstMaterial="softEdge">
+                <a:bevelT w="25400" h="38100"/>
+              </a:sp3d>
+            </a:bodyPr>
+            <a:lstStyle/>
+            <a:p>
+              <a:pPr algn="ctr"/>
+              <a:endParaRPr lang="en-US" b="1">
+                <a:ln/>
+                <a:solidFill>
+                  <a:schemeClr val="accent4"/>
+                </a:solidFill>
+              </a:endParaRPr>
+            </a:p>
+          </p:txBody>
+        </p:sp>
+      </p:grpSp>
+      <p:sp>
+        <p:nvSpPr>
+          <p:cNvPr id="95" name="Rectangle 94">
+            <a:extLst>
+              <a:ext uri="{FF2B5EF4-FFF2-40B4-BE49-F238E27FC236}">
+                <a16:creationId xmlns:a16="http://schemas.microsoft.com/office/drawing/2014/main" id="{A2074F0C-5E4B-DA45-B46B-EF3388966E9E}"/>
+              </a:ext>
+            </a:extLst>
+          </p:cNvPr>
+          <p:cNvSpPr/>
+          <p:nvPr/>
+        </p:nvSpPr>
+        <p:spPr>
+          <a:xfrm>
+            <a:off x="7741207" y="6411602"/>
+            <a:ext cx="2304769" cy="369332"/>
+          </a:xfrm>
+          <a:prstGeom prst="rect">
+            <a:avLst/>
+          </a:prstGeom>
+        </p:spPr>
+        <p:txBody>
+          <a:bodyPr wrap="square">
+            <a:spAutoFit/>
+          </a:bodyPr>
+          <a:lstStyle/>
+          <a:p>
+            <a:r>
+              <a:rPr lang="en-US" dirty="0"/>
+              <a:t>(RRRR) + 1 </a:t>
+            </a:r>
+          </a:p>
+        </p:txBody>
+      </p:sp>
+    </p:spTree>
+    <p:extLst>
+      <p:ext uri="{BB962C8B-B14F-4D97-AF65-F5344CB8AC3E}">
+        <p14:creationId xmlns:p14="http://schemas.microsoft.com/office/powerpoint/2010/main" val="316440167"/>
+      </p:ext>
+    </p:extLst>
+  </p:cSld>
+  <p:clrMapOvr>
+    <a:masterClrMapping/>
+  </p:clrMapOvr>
+</p:sld>
+</file>
+
+<file path=ppt/slides/slide11.xml><?xml version="1.0" encoding="utf-8"?>
 <p:sld xmlns:a="http://schemas.openxmlformats.org/drawingml/2006/main" xmlns:r="http://schemas.openxmlformats.org/officeDocument/2006/relationships" xmlns:p="http://schemas.openxmlformats.org/presentationml/2006/main">
   <p:cSld>
     <p:spTree>
@@ -8599,7 +10976,7 @@
 </p:sld>
 </file>
 
-<file path=ppt/slides/slide11.xml><?xml version="1.0" encoding="utf-8"?>
+<file path=ppt/slides/slide12.xml><?xml version="1.0" encoding="utf-8"?>
 <p:sld xmlns:a="http://schemas.openxmlformats.org/drawingml/2006/main" xmlns:r="http://schemas.openxmlformats.org/officeDocument/2006/relationships" xmlns:p="http://schemas.openxmlformats.org/presentationml/2006/main">
   <p:cSld>
     <p:spTree>
@@ -13184,7 +15561,7 @@
 </p:sld>
 </file>
 
-<file path=ppt/slides/slide12.xml><?xml version="1.0" encoding="utf-8"?>
+<file path=ppt/slides/slide13.xml><?xml version="1.0" encoding="utf-8"?>
 <p:sld xmlns:a="http://schemas.openxmlformats.org/drawingml/2006/main" xmlns:r="http://schemas.openxmlformats.org/officeDocument/2006/relationships" xmlns:p="http://schemas.openxmlformats.org/presentationml/2006/main">
   <p:cSld>
     <p:spTree>
@@ -17517,7 +19894,7 @@
 </p:sld>
 </file>
 
-<file path=ppt/slides/slide13.xml><?xml version="1.0" encoding="utf-8"?>
+<file path=ppt/slides/slide14.xml><?xml version="1.0" encoding="utf-8"?>
 <p:sld xmlns:a="http://schemas.openxmlformats.org/drawingml/2006/main" xmlns:r="http://schemas.openxmlformats.org/officeDocument/2006/relationships" xmlns:p="http://schemas.openxmlformats.org/presentationml/2006/main">
   <p:cSld>
     <p:spTree>

</xml_diff>